<commit_message>
WiFI handling AP/STA updated
</commit_message>
<xml_diff>
--- a/Oli.pptx
+++ b/Oli.pptx
@@ -6,6 +6,7 @@
   </p:sldMasterIdLst>
   <p:sldIdLst>
     <p:sldId id="256" r:id="rId2"/>
+    <p:sldId id="257" r:id="rId3"/>
   </p:sldIdLst>
   <p:sldSz cx="12192000" cy="6858000"/>
   <p:notesSz cx="6858000" cy="9144000"/>
@@ -3391,7 +3392,7 @@
             <a:pPr algn="ctr"/>
             <a:r>
               <a:rPr lang="en-NL" sz="1100" dirty="0"/>
-              <a:t>Mode: AccessPoint</a:t>
+              <a:t>Mode: APSTA</a:t>
             </a:r>
           </a:p>
           <a:p>
@@ -3470,7 +3471,7 @@
         </p:nvSpPr>
         <p:spPr>
           <a:xfrm>
-            <a:off x="3767511" y="1069197"/>
+            <a:off x="3616204" y="1069197"/>
             <a:ext cx="866330" cy="838664"/>
           </a:xfrm>
           <a:prstGeom prst="roundRect">
@@ -3591,7 +3592,7 @@
         </p:nvSpPr>
         <p:spPr>
           <a:xfrm>
-            <a:off x="1445501" y="5403193"/>
+            <a:off x="1445501" y="5928520"/>
             <a:ext cx="767256" cy="561222"/>
           </a:xfrm>
           <a:prstGeom prst="roundRect">
@@ -3752,21 +3753,14 @@
             <a:pPr algn="ctr"/>
             <a:r>
               <a:rPr lang="en-NL" sz="1100" dirty="0"/>
-              <a:t>Mode: Station</a:t>
+              <a:t>Connect to Your WiFi</a:t>
             </a:r>
           </a:p>
           <a:p>
             <a:pPr algn="ctr"/>
             <a:r>
               <a:rPr lang="en-NL" sz="1100" dirty="0"/>
-              <a:t>Connect to Your WiFi</a:t>
-            </a:r>
-          </a:p>
-          <a:p>
-            <a:pPr algn="ctr"/>
-            <a:r>
-              <a:rPr lang="en-NL" sz="1100" dirty="0"/>
-              <a:t>Hostname: Oli</a:t>
+              <a:t>Hostname: Oli.local</a:t>
             </a:r>
           </a:p>
           <a:p>
@@ -3792,7 +3786,7 @@
         </p:nvSpPr>
         <p:spPr>
           <a:xfrm>
-            <a:off x="4960646" y="2658578"/>
+            <a:off x="4960646" y="2283127"/>
             <a:ext cx="767257" cy="280611"/>
           </a:xfrm>
           <a:prstGeom prst="roundRect">
@@ -3864,7 +3858,7 @@
         </p:nvSpPr>
         <p:spPr>
           <a:xfrm>
-            <a:off x="3767511" y="2946074"/>
+            <a:off x="3662193" y="2568806"/>
             <a:ext cx="866330" cy="838664"/>
           </a:xfrm>
           <a:prstGeom prst="roundRect">
@@ -3913,8 +3907,8 @@
         </p:nvSpPr>
         <p:spPr>
           <a:xfrm>
-            <a:off x="4960646" y="2939189"/>
-            <a:ext cx="783677" cy="838664"/>
+            <a:off x="4712894" y="2563738"/>
+            <a:ext cx="1312222" cy="838664"/>
           </a:xfrm>
           <a:prstGeom prst="roundRect">
             <a:avLst/>
@@ -3942,8 +3936,31 @@
           <a:p>
             <a:pPr algn="ctr"/>
             <a:r>
+              <a:rPr lang="en-NL" sz="1100" dirty="0">
+                <a:solidFill>
+                  <a:schemeClr val="bg1"/>
+                </a:solidFill>
+                <a:hlinkClick r:id="rId2">
+                  <a:extLst>
+                    <a:ext uri="{A12FA001-AC4F-418D-AE19-62706E023703}">
+                      <ahyp:hlinkClr xmlns:ahyp="http://schemas.microsoft.com/office/drawing/2018/hyperlinkcolor" val="tx"/>
+                    </a:ext>
+                  </a:extLst>
+                </a:hlinkClick>
+              </a:rPr>
+              <a:t>http://oli.local</a:t>
+            </a:r>
+            <a:endParaRPr lang="en-NL" sz="1100" dirty="0">
+              <a:solidFill>
+                <a:schemeClr val="bg1"/>
+              </a:solidFill>
+            </a:endParaRPr>
+          </a:p>
+          <a:p>
+            <a:pPr algn="ctr"/>
+            <a:r>
               <a:rPr lang="en-NL" sz="1100" dirty="0"/>
-              <a:t>http://oli</a:t>
+              <a:t>http://192.168.x.y</a:t>
             </a:r>
           </a:p>
         </p:txBody>
@@ -4034,8 +4051,8 @@
         </p:nvSpPr>
         <p:spPr>
           <a:xfrm>
-            <a:off x="4960646" y="1069197"/>
-            <a:ext cx="783677" cy="838664"/>
+            <a:off x="4720856" y="1069197"/>
+            <a:ext cx="1304260" cy="838664"/>
           </a:xfrm>
           <a:prstGeom prst="roundRect">
             <a:avLst/>
@@ -4063,8 +4080,31 @@
           <a:p>
             <a:pPr algn="ctr"/>
             <a:r>
+              <a:rPr lang="en-NL" sz="1100" dirty="0">
+                <a:solidFill>
+                  <a:schemeClr val="bg1"/>
+                </a:solidFill>
+                <a:hlinkClick r:id="rId2">
+                  <a:extLst>
+                    <a:ext uri="{A12FA001-AC4F-418D-AE19-62706E023703}">
+                      <ahyp:hlinkClr xmlns:ahyp="http://schemas.microsoft.com/office/drawing/2018/hyperlinkcolor" val="tx"/>
+                    </a:ext>
+                  </a:extLst>
+                </a:hlinkClick>
+              </a:rPr>
+              <a:t>http://oli.local</a:t>
+            </a:r>
+            <a:endParaRPr lang="en-NL" sz="1100" dirty="0">
+              <a:solidFill>
+                <a:schemeClr val="bg1"/>
+              </a:solidFill>
+            </a:endParaRPr>
+          </a:p>
+          <a:p>
+            <a:pPr algn="ctr"/>
+            <a:r>
               <a:rPr lang="en-NL" sz="1100" dirty="0"/>
-              <a:t>http://oli</a:t>
+              <a:t>http://10.0.0.0</a:t>
             </a:r>
           </a:p>
         </p:txBody>
@@ -4092,7 +4132,7 @@
           </a:xfrm>
           <a:prstGeom prst="bentConnector3">
             <a:avLst>
-              <a:gd name="adj1" fmla="val 42176"/>
+              <a:gd name="adj1" fmla="val 24036"/>
             </a:avLst>
           </a:prstGeom>
           <a:ln w="82550">
@@ -4131,7 +4171,7 @@
         </p:nvSpPr>
         <p:spPr>
           <a:xfrm>
-            <a:off x="6372516" y="4299958"/>
+            <a:off x="6222423" y="3466718"/>
             <a:ext cx="1629722" cy="461641"/>
           </a:xfrm>
           <a:prstGeom prst="roundRect">
@@ -4180,7 +4220,7 @@
         </p:nvSpPr>
         <p:spPr>
           <a:xfrm>
-            <a:off x="8175916" y="4299958"/>
+            <a:off x="8025823" y="3466718"/>
             <a:ext cx="783677" cy="461641"/>
           </a:xfrm>
           <a:prstGeom prst="roundRect">
@@ -4229,7 +4269,7 @@
         </p:nvSpPr>
         <p:spPr>
           <a:xfrm>
-            <a:off x="257723" y="5387013"/>
+            <a:off x="257723" y="5912340"/>
             <a:ext cx="767256" cy="561222"/>
           </a:xfrm>
           <a:prstGeom prst="roundRect">
@@ -4400,7 +4440,7 @@
           <a:p>
             <a:r>
               <a:rPr lang="en-NL" sz="1100" dirty="0"/>
-              <a:t>AP-mode</a:t>
+              <a:t>APSTA-mode</a:t>
             </a:r>
           </a:p>
         </p:txBody>
@@ -4498,7 +4538,7 @@
           <a:p>
             <a:r>
               <a:rPr lang="en-NL" sz="1100" dirty="0"/>
-              <a:t>STA-mode</a:t>
+              <a:t>APSTA-mode</a:t>
             </a:r>
           </a:p>
         </p:txBody>
@@ -4517,7 +4557,7 @@
         </p:nvSpPr>
         <p:spPr>
           <a:xfrm>
-            <a:off x="2677566" y="5601195"/>
+            <a:off x="2677566" y="6126522"/>
             <a:ext cx="2012950" cy="612648"/>
           </a:xfrm>
           <a:prstGeom prst="wedgeEllipseCallout">
@@ -4574,7 +4614,7 @@
         </p:nvSpPr>
         <p:spPr>
           <a:xfrm>
-            <a:off x="6546194" y="4731758"/>
+            <a:off x="6396101" y="3898518"/>
             <a:ext cx="1629722" cy="461641"/>
           </a:xfrm>
           <a:prstGeom prst="roundRect">
@@ -4623,7 +4663,7 @@
         </p:nvSpPr>
         <p:spPr>
           <a:xfrm>
-            <a:off x="8349594" y="4731758"/>
+            <a:off x="8199501" y="3898518"/>
             <a:ext cx="783677" cy="461641"/>
           </a:xfrm>
           <a:prstGeom prst="roundRect">
@@ -4672,7 +4712,7 @@
         </p:nvSpPr>
         <p:spPr>
           <a:xfrm>
-            <a:off x="1435100" y="4770621"/>
+            <a:off x="1435100" y="5295948"/>
             <a:ext cx="767256" cy="561222"/>
           </a:xfrm>
           <a:prstGeom prst="roundRect">
@@ -4720,7 +4760,7 @@
         </p:nvSpPr>
         <p:spPr>
           <a:xfrm>
-            <a:off x="1024979" y="4909342"/>
+            <a:off x="1024979" y="5434669"/>
             <a:ext cx="410121" cy="283780"/>
           </a:xfrm>
           <a:prstGeom prst="rightArrow">
@@ -4766,7 +4806,7 @@
         </p:nvSpPr>
         <p:spPr>
           <a:xfrm>
-            <a:off x="257723" y="4762531"/>
+            <a:off x="257723" y="5287858"/>
             <a:ext cx="767256" cy="561222"/>
           </a:xfrm>
           <a:prstGeom prst="roundRect">
@@ -4812,7 +4852,7 @@
         </p:nvSpPr>
         <p:spPr>
           <a:xfrm>
-            <a:off x="3802558" y="4770621"/>
+            <a:off x="3802558" y="5295948"/>
             <a:ext cx="767256" cy="561222"/>
           </a:xfrm>
           <a:prstGeom prst="roundRect">
@@ -4860,7 +4900,7 @@
         </p:nvSpPr>
         <p:spPr>
           <a:xfrm>
-            <a:off x="2618829" y="4762531"/>
+            <a:off x="2618829" y="5287858"/>
             <a:ext cx="767256" cy="561222"/>
           </a:xfrm>
           <a:prstGeom prst="roundRect">
@@ -4910,7 +4950,7 @@
         </p:nvSpPr>
         <p:spPr>
           <a:xfrm>
-            <a:off x="4979935" y="4748765"/>
+            <a:off x="4979935" y="5274092"/>
             <a:ext cx="767256" cy="561222"/>
           </a:xfrm>
           <a:prstGeom prst="roundRect">
@@ -4958,7 +4998,7 @@
         </p:nvSpPr>
         <p:spPr>
           <a:xfrm>
-            <a:off x="4576166" y="4901252"/>
+            <a:off x="4576166" y="5426579"/>
             <a:ext cx="410121" cy="283780"/>
           </a:xfrm>
           <a:prstGeom prst="rightArrow">
@@ -5004,7 +5044,7 @@
         </p:nvSpPr>
         <p:spPr>
           <a:xfrm>
-            <a:off x="3386085" y="4901252"/>
+            <a:off x="3386085" y="5426579"/>
             <a:ext cx="410121" cy="283780"/>
           </a:xfrm>
           <a:prstGeom prst="rightArrow">
@@ -5050,7 +5090,7 @@
         </p:nvSpPr>
         <p:spPr>
           <a:xfrm>
-            <a:off x="2202356" y="4901252"/>
+            <a:off x="2202356" y="5426579"/>
             <a:ext cx="410121" cy="283780"/>
           </a:xfrm>
           <a:prstGeom prst="rightArrow">
@@ -5096,7 +5136,7 @@
         </p:nvSpPr>
         <p:spPr>
           <a:xfrm>
-            <a:off x="1024979" y="5533824"/>
+            <a:off x="1024979" y="6059151"/>
             <a:ext cx="410121" cy="283780"/>
           </a:xfrm>
           <a:prstGeom prst="rightArrow">
@@ -5199,7 +5239,7 @@
         </p:nvSpPr>
         <p:spPr>
           <a:xfrm>
-            <a:off x="7105941" y="3475703"/>
+            <a:off x="6955848" y="2642463"/>
             <a:ext cx="2012950" cy="612648"/>
           </a:xfrm>
           <a:prstGeom prst="wedgeEllipseCallout">
@@ -5276,7 +5316,7 @@
         </p:nvSpPr>
         <p:spPr>
           <a:xfrm>
-            <a:off x="6489700" y="5788803"/>
+            <a:off x="6534529" y="6034103"/>
             <a:ext cx="2494055" cy="571500"/>
           </a:xfrm>
           <a:prstGeom prst="ellipse">
@@ -5309,6 +5349,13 @@
               <a:t>Execute scenarios</a:t>
             </a:r>
           </a:p>
+          <a:p>
+            <a:pPr algn="ctr"/>
+            <a:r>
+              <a:rPr lang="en-NL" sz="1100" dirty="0"/>
+              <a:t>Manage summer &amp; wintertime</a:t>
+            </a:r>
+          </a:p>
         </p:txBody>
       </p:sp>
       <p:sp>
@@ -5360,7 +5407,7 @@
         </p:nvSpPr>
         <p:spPr>
           <a:xfrm>
-            <a:off x="7187377" y="5334056"/>
+            <a:off x="7232206" y="5579356"/>
             <a:ext cx="1098699" cy="369332"/>
           </a:xfrm>
           <a:prstGeom prst="rect">
@@ -5470,7 +5517,7 @@
             </a:r>
             <a:r>
               <a:rPr lang="en-GB" sz="1100" dirty="0">
-                <a:hlinkClick r:id="rId2"/>
+                <a:hlinkClick r:id="rId3"/>
               </a:rPr>
               <a:t>http://oli</a:t>
             </a:r>
@@ -5617,8 +5664,8 @@
         </p:nvSpPr>
         <p:spPr>
           <a:xfrm>
-            <a:off x="10686832" y="4014918"/>
-            <a:ext cx="1312222" cy="2052729"/>
+            <a:off x="9514434" y="3918888"/>
+            <a:ext cx="2514723" cy="2087379"/>
           </a:xfrm>
           <a:prstGeom prst="roundRect">
             <a:avLst/>
@@ -5655,7 +5702,7 @@
               <a:buChar char="•"/>
             </a:pPr>
             <a:r>
-              <a:rPr lang="en-GB" sz="1100" dirty="0"/>
+              <a:rPr lang="en-GB" sz="1100" strike="sngStrike" dirty="0"/>
               <a:t>Control LEDs</a:t>
             </a:r>
           </a:p>
@@ -5666,7 +5713,7 @@
             </a:pPr>
             <a:r>
               <a:rPr lang="en-GB" sz="1100" dirty="0"/>
-              <a:t>RTC</a:t>
+              <a:t>Store data in flash</a:t>
             </a:r>
           </a:p>
           <a:p>
@@ -5675,8 +5722,8 @@
               <a:buChar char="•"/>
             </a:pPr>
             <a:r>
-              <a:rPr lang="en-GB" sz="1100" dirty="0"/>
-              <a:t>Store data in flash</a:t>
+              <a:rPr lang="en-GB" sz="1100" strike="sngStrike" dirty="0"/>
+              <a:t>Create webpages</a:t>
             </a:r>
           </a:p>
           <a:p>
@@ -5685,8 +5732,8 @@
               <a:buChar char="•"/>
             </a:pPr>
             <a:r>
-              <a:rPr lang="en-GB" sz="1100" strike="sngStrike" dirty="0"/>
-              <a:t>Create webpages</a:t>
+              <a:rPr lang="en-GB" sz="1100" dirty="0"/>
+              <a:t>Create scenario in SW</a:t>
             </a:r>
           </a:p>
           <a:p>
@@ -5696,7 +5743,15 @@
             </a:pPr>
             <a:r>
               <a:rPr lang="en-GB" sz="1100" dirty="0"/>
-              <a:t>Create scenario in SW</a:t>
+              <a:t>Mode AP </a:t>
+            </a:r>
+            <a:r>
+              <a:rPr lang="en-GB" sz="1100" dirty="0" err="1"/>
+              <a:t>en</a:t>
+            </a:r>
+            <a:r>
+              <a:rPr lang="en-GB" sz="1100" dirty="0"/>
+              <a:t> STA</a:t>
             </a:r>
           </a:p>
           <a:p>
@@ -5706,16 +5761,67 @@
             </a:pPr>
             <a:r>
               <a:rPr lang="en-GB" sz="1100" dirty="0"/>
-              <a:t>Mode AP </a:t>
-            </a:r>
-            <a:r>
-              <a:rPr lang="en-GB" sz="1100" dirty="0" err="1"/>
-              <a:t>en</a:t>
-            </a:r>
-            <a:r>
+              <a:t>RTC:</a:t>
+            </a:r>
+          </a:p>
+          <a:p>
+            <a:pPr marL="628650" lvl="1" indent="-171450">
+              <a:buFont typeface="Arial" panose="020B0604020202020204" pitchFamily="34" charset="0"/>
+              <a:buChar char="•"/>
+            </a:pPr>
+            <a:r>
+              <a:rPr lang="en-GB" sz="1100" dirty="0">
+                <a:solidFill>
+                  <a:schemeClr val="bg1"/>
+                </a:solidFill>
+                <a:hlinkClick r:id="rId4">
+                  <a:extLst>
+                    <a:ext uri="{A12FA001-AC4F-418D-AE19-62706E023703}">
+                      <ahyp:hlinkClr xmlns:ahyp="http://schemas.microsoft.com/office/drawing/2018/hyperlinkcolor" val="tx"/>
+                    </a:ext>
+                  </a:extLst>
+                </a:hlinkClick>
+              </a:rPr>
+              <a:t>https://github.com/JChristensen/Timezone</a:t>
+            </a:r>
+            <a:endParaRPr lang="en-GB" sz="1100" dirty="0">
+              <a:solidFill>
+                <a:schemeClr val="bg1"/>
+              </a:solidFill>
+            </a:endParaRPr>
+          </a:p>
+          <a:p>
+            <a:pPr marL="628650" lvl="1" indent="-171450">
+              <a:buFont typeface="Arial" panose="020B0604020202020204" pitchFamily="34" charset="0"/>
+              <a:buChar char="•"/>
+            </a:pPr>
+            <a:r>
+              <a:rPr lang="en-GB" sz="1100" dirty="0">
+                <a:solidFill>
+                  <a:schemeClr val="bg1"/>
+                </a:solidFill>
+                <a:hlinkClick r:id="rId5">
+                  <a:extLst>
+                    <a:ext uri="{A12FA001-AC4F-418D-AE19-62706E023703}">
+                      <ahyp:hlinkClr xmlns:ahyp="http://schemas.microsoft.com/office/drawing/2018/hyperlinkcolor" val="tx"/>
+                    </a:ext>
+                  </a:extLst>
+                </a:hlinkClick>
+              </a:rPr>
+              <a:t>https://github.com/PaulStoffregen/Time</a:t>
+            </a:r>
+            <a:r>
+              <a:rPr lang="en-GB" sz="1100" dirty="0">
+                <a:solidFill>
+                  <a:schemeClr val="bg1"/>
+                </a:solidFill>
+              </a:rPr>
+              <a:t> </a:t>
+            </a:r>
+            <a:br>
               <a:rPr lang="en-GB" sz="1100" dirty="0"/>
-              <a:t> STA</a:t>
-            </a:r>
+            </a:br>
+            <a:endParaRPr lang="en-GB" sz="1100" dirty="0"/>
           </a:p>
         </p:txBody>
       </p:sp>
@@ -5850,8 +5956,8 @@
         </p:nvCxnSpPr>
         <p:spPr>
           <a:xfrm>
-            <a:off x="1073150" y="4206431"/>
-            <a:ext cx="3113036" cy="564190"/>
+            <a:off x="1024979" y="4947156"/>
+            <a:ext cx="3161207" cy="348792"/>
           </a:xfrm>
           <a:prstGeom prst="bentConnector2">
             <a:avLst/>
@@ -5892,8 +5998,8 @@
         </p:nvSpPr>
         <p:spPr>
           <a:xfrm>
-            <a:off x="257723" y="3972341"/>
-            <a:ext cx="815427" cy="468179"/>
+            <a:off x="257723" y="4713066"/>
+            <a:ext cx="767256" cy="468179"/>
           </a:xfrm>
           <a:prstGeom prst="roundRect">
             <a:avLst/>
@@ -5939,11 +6045,11 @@
         <p:spPr>
           <a:xfrm>
             <a:off x="1679731" y="241836"/>
-            <a:ext cx="1524213" cy="541744"/>
+            <a:ext cx="1857367" cy="541744"/>
           </a:xfrm>
           <a:prstGeom prst="wedgeEllipseCallout">
             <a:avLst>
-              <a:gd name="adj1" fmla="val -106780"/>
+              <a:gd name="adj1" fmla="val -85790"/>
               <a:gd name="adj2" fmla="val 91790"/>
             </a:avLst>
           </a:prstGeom>
@@ -5976,7 +6082,7 @@
           <a:p>
             <a:r>
               <a:rPr lang="en-NL" sz="1100" dirty="0"/>
-              <a:t>No configured</a:t>
+              <a:t>Not configured</a:t>
             </a:r>
           </a:p>
           <a:p>
@@ -5986,7 +6092,7 @@
                   <a:srgbClr val="FF0000"/>
                 </a:solidFill>
               </a:rPr>
-              <a:t>Soft red color</a:t>
+              <a:t>LED1: Soft red color</a:t>
             </a:r>
           </a:p>
         </p:txBody>
@@ -6075,13 +6181,13 @@
         </p:nvSpPr>
         <p:spPr>
           <a:xfrm>
-            <a:off x="8938520" y="5204352"/>
+            <a:off x="7138349" y="4592956"/>
             <a:ext cx="1630160" cy="541744"/>
           </a:xfrm>
           <a:prstGeom prst="wedgeEllipseCallout">
             <a:avLst>
-              <a:gd name="adj1" fmla="val -42860"/>
-              <a:gd name="adj2" fmla="val -65222"/>
+              <a:gd name="adj1" fmla="val 31061"/>
+              <a:gd name="adj2" fmla="val -96624"/>
             </a:avLst>
           </a:prstGeom>
           <a:solidFill>
@@ -6364,10 +6470,1366 @@
           </a:p>
         </p:txBody>
       </p:sp>
+      <p:sp>
+        <p:nvSpPr>
+          <p:cNvPr id="99" name="Rounded Rectangle 98">
+            <a:extLst>
+              <a:ext uri="{FF2B5EF4-FFF2-40B4-BE49-F238E27FC236}">
+                <a16:creationId xmlns:a16="http://schemas.microsoft.com/office/drawing/2014/main" id="{CF0B40E5-FB9F-756A-C1B0-A72706E300C5}"/>
+              </a:ext>
+            </a:extLst>
+          </p:cNvPr>
+          <p:cNvSpPr/>
+          <p:nvPr/>
+        </p:nvSpPr>
+        <p:spPr>
+          <a:xfrm>
+            <a:off x="3662192" y="3465248"/>
+            <a:ext cx="2355577" cy="461641"/>
+          </a:xfrm>
+          <a:prstGeom prst="roundRect">
+            <a:avLst/>
+          </a:prstGeom>
+        </p:spPr>
+        <p:style>
+          <a:lnRef idx="2">
+            <a:schemeClr val="accent5">
+              <a:shade val="15000"/>
+            </a:schemeClr>
+          </a:lnRef>
+          <a:fillRef idx="1">
+            <a:schemeClr val="accent5"/>
+          </a:fillRef>
+          <a:effectRef idx="0">
+            <a:schemeClr val="accent5"/>
+          </a:effectRef>
+          <a:fontRef idx="minor">
+            <a:schemeClr val="lt1"/>
+          </a:fontRef>
+        </p:style>
+        <p:txBody>
+          <a:bodyPr rtlCol="0" anchor="ctr"/>
+          <a:lstStyle/>
+          <a:p>
+            <a:pPr algn="ctr"/>
+            <a:r>
+              <a:rPr lang="en-NL" sz="1100" dirty="0"/>
+              <a:t>Switch off AP mode if STA connect succeeds</a:t>
+            </a:r>
+          </a:p>
+        </p:txBody>
+      </p:sp>
+      <p:sp>
+        <p:nvSpPr>
+          <p:cNvPr id="102" name="Rounded Rectangle 101">
+            <a:extLst>
+              <a:ext uri="{FF2B5EF4-FFF2-40B4-BE49-F238E27FC236}">
+                <a16:creationId xmlns:a16="http://schemas.microsoft.com/office/drawing/2014/main" id="{87A708D1-AB56-C0BD-3E2C-ED7ED4609474}"/>
+              </a:ext>
+            </a:extLst>
+          </p:cNvPr>
+          <p:cNvSpPr/>
+          <p:nvPr/>
+        </p:nvSpPr>
+        <p:spPr>
+          <a:xfrm>
+            <a:off x="11134385" y="2444782"/>
+            <a:ext cx="767257" cy="280611"/>
+          </a:xfrm>
+          <a:prstGeom prst="roundRect">
+            <a:avLst/>
+          </a:prstGeom>
+        </p:spPr>
+        <p:style>
+          <a:lnRef idx="1">
+            <a:schemeClr val="accent3"/>
+          </a:lnRef>
+          <a:fillRef idx="2">
+            <a:schemeClr val="accent3"/>
+          </a:fillRef>
+          <a:effectRef idx="1">
+            <a:schemeClr val="accent3"/>
+          </a:effectRef>
+          <a:fontRef idx="minor">
+            <a:schemeClr val="dk1"/>
+          </a:fontRef>
+        </p:style>
+        <p:txBody>
+          <a:bodyPr rtlCol="0" anchor="ctr"/>
+          <a:lstStyle/>
+          <a:p>
+            <a:pPr algn="ctr"/>
+            <a:r>
+              <a:rPr lang="en-NL" sz="1100" dirty="0">
+                <a:solidFill>
+                  <a:schemeClr val="tx1"/>
+                </a:solidFill>
+              </a:rPr>
+              <a:t>Redirect</a:t>
+            </a:r>
+          </a:p>
+        </p:txBody>
+      </p:sp>
     </p:spTree>
     <p:extLst>
       <p:ext uri="{BB962C8B-B14F-4D97-AF65-F5344CB8AC3E}">
         <p14:creationId xmlns:p14="http://schemas.microsoft.com/office/powerpoint/2010/main" val="3326699150"/>
+      </p:ext>
+    </p:extLst>
+  </p:cSld>
+  <p:clrMapOvr>
+    <a:masterClrMapping/>
+  </p:clrMapOvr>
+</p:sld>
+</file>
+
+<file path=ppt/slides/slide2.xml><?xml version="1.0" encoding="utf-8"?>
+<p:sld xmlns:a="http://schemas.openxmlformats.org/drawingml/2006/main" xmlns:r="http://schemas.openxmlformats.org/officeDocument/2006/relationships" xmlns:p="http://schemas.openxmlformats.org/presentationml/2006/main">
+  <p:cSld>
+    <p:spTree>
+      <p:nvGrpSpPr>
+        <p:cNvPr id="1" name=""/>
+        <p:cNvGrpSpPr/>
+        <p:nvPr/>
+      </p:nvGrpSpPr>
+      <p:grpSpPr>
+        <a:xfrm>
+          <a:off x="0" y="0"/>
+          <a:ext cx="0" cy="0"/>
+          <a:chOff x="0" y="0"/>
+          <a:chExt cx="0" cy="0"/>
+        </a:xfrm>
+      </p:grpSpPr>
+      <p:sp>
+        <p:nvSpPr>
+          <p:cNvPr id="4" name="Oval 3">
+            <a:extLst>
+              <a:ext uri="{FF2B5EF4-FFF2-40B4-BE49-F238E27FC236}">
+                <a16:creationId xmlns:a16="http://schemas.microsoft.com/office/drawing/2014/main" id="{2FD76287-EBD3-0B68-DF8F-0E369FBFDADC}"/>
+              </a:ext>
+            </a:extLst>
+          </p:cNvPr>
+          <p:cNvSpPr/>
+          <p:nvPr/>
+        </p:nvSpPr>
+        <p:spPr>
+          <a:xfrm>
+            <a:off x="1984743" y="1409272"/>
+            <a:ext cx="219739" cy="226828"/>
+          </a:xfrm>
+          <a:prstGeom prst="ellipse">
+            <a:avLst/>
+          </a:prstGeom>
+        </p:spPr>
+        <p:style>
+          <a:lnRef idx="2">
+            <a:schemeClr val="accent5">
+              <a:shade val="15000"/>
+            </a:schemeClr>
+          </a:lnRef>
+          <a:fillRef idx="1">
+            <a:schemeClr val="accent5"/>
+          </a:fillRef>
+          <a:effectRef idx="0">
+            <a:schemeClr val="accent5"/>
+          </a:effectRef>
+          <a:fontRef idx="minor">
+            <a:schemeClr val="lt1"/>
+          </a:fontRef>
+        </p:style>
+        <p:txBody>
+          <a:bodyPr rtlCol="0" anchor="ctr"/>
+          <a:lstStyle/>
+          <a:p>
+            <a:pPr algn="ctr"/>
+            <a:endParaRPr lang="en-NL"/>
+          </a:p>
+        </p:txBody>
+      </p:sp>
+      <p:sp>
+        <p:nvSpPr>
+          <p:cNvPr id="5" name="Rounded Rectangle 4">
+            <a:extLst>
+              <a:ext uri="{FF2B5EF4-FFF2-40B4-BE49-F238E27FC236}">
+                <a16:creationId xmlns:a16="http://schemas.microsoft.com/office/drawing/2014/main" id="{B3638FA8-BDCE-DE91-67F7-AE8D7BFBF68D}"/>
+              </a:ext>
+            </a:extLst>
+          </p:cNvPr>
+          <p:cNvSpPr/>
+          <p:nvPr/>
+        </p:nvSpPr>
+        <p:spPr>
+          <a:xfrm>
+            <a:off x="1555897" y="2679405"/>
+            <a:ext cx="1077432" cy="368595"/>
+          </a:xfrm>
+          <a:prstGeom prst="roundRect">
+            <a:avLst/>
+          </a:prstGeom>
+        </p:spPr>
+        <p:style>
+          <a:lnRef idx="2">
+            <a:schemeClr val="accent5">
+              <a:shade val="15000"/>
+            </a:schemeClr>
+          </a:lnRef>
+          <a:fillRef idx="1">
+            <a:schemeClr val="accent5"/>
+          </a:fillRef>
+          <a:effectRef idx="0">
+            <a:schemeClr val="accent5"/>
+          </a:effectRef>
+          <a:fontRef idx="minor">
+            <a:schemeClr val="lt1"/>
+          </a:fontRef>
+        </p:style>
+        <p:txBody>
+          <a:bodyPr rtlCol="0" anchor="ctr"/>
+          <a:lstStyle/>
+          <a:p>
+            <a:pPr algn="ctr"/>
+            <a:r>
+              <a:rPr lang="en-NL" sz="1200" dirty="0"/>
+              <a:t>AP=true</a:t>
+            </a:r>
+          </a:p>
+          <a:p>
+            <a:pPr algn="ctr"/>
+            <a:r>
+              <a:rPr lang="en-NL" sz="1200" dirty="0"/>
+              <a:t>STA=false</a:t>
+            </a:r>
+          </a:p>
+        </p:txBody>
+      </p:sp>
+      <p:cxnSp>
+        <p:nvCxnSpPr>
+          <p:cNvPr id="7" name="Curved Connector 6">
+            <a:extLst>
+              <a:ext uri="{FF2B5EF4-FFF2-40B4-BE49-F238E27FC236}">
+                <a16:creationId xmlns:a16="http://schemas.microsoft.com/office/drawing/2014/main" id="{ADB89847-05A5-F193-B033-30AEDD24F8CA}"/>
+              </a:ext>
+            </a:extLst>
+          </p:cNvPr>
+          <p:cNvCxnSpPr>
+            <a:stCxn id="4" idx="4"/>
+            <a:endCxn id="5" idx="0"/>
+          </p:cNvCxnSpPr>
+          <p:nvPr/>
+        </p:nvCxnSpPr>
+        <p:spPr>
+          <a:xfrm rot="5400000">
+            <a:off x="1572961" y="2157752"/>
+            <a:ext cx="1043305" cy="12700"/>
+          </a:xfrm>
+          <a:prstGeom prst="curvedConnector3">
+            <a:avLst/>
+          </a:prstGeom>
+          <a:ln w="38100">
+            <a:tailEnd type="triangle"/>
+          </a:ln>
+        </p:spPr>
+        <p:style>
+          <a:lnRef idx="1">
+            <a:schemeClr val="accent1"/>
+          </a:lnRef>
+          <a:fillRef idx="0">
+            <a:schemeClr val="accent1"/>
+          </a:fillRef>
+          <a:effectRef idx="0">
+            <a:schemeClr val="accent1"/>
+          </a:effectRef>
+          <a:fontRef idx="minor">
+            <a:schemeClr val="tx1"/>
+          </a:fontRef>
+        </p:style>
+      </p:cxnSp>
+      <p:sp>
+        <p:nvSpPr>
+          <p:cNvPr id="8" name="TextBox 7">
+            <a:extLst>
+              <a:ext uri="{FF2B5EF4-FFF2-40B4-BE49-F238E27FC236}">
+                <a16:creationId xmlns:a16="http://schemas.microsoft.com/office/drawing/2014/main" id="{EC07317B-8465-BC50-1B29-CD3CB264801C}"/>
+              </a:ext>
+            </a:extLst>
+          </p:cNvPr>
+          <p:cNvSpPr txBox="1"/>
+          <p:nvPr/>
+        </p:nvSpPr>
+        <p:spPr>
+          <a:xfrm>
+            <a:off x="1363262" y="1674575"/>
+            <a:ext cx="737702" cy="430887"/>
+          </a:xfrm>
+          <a:prstGeom prst="rect">
+            <a:avLst/>
+          </a:prstGeom>
+          <a:noFill/>
+        </p:spPr>
+        <p:txBody>
+          <a:bodyPr wrap="none" rtlCol="0">
+            <a:spAutoFit/>
+          </a:bodyPr>
+          <a:lstStyle/>
+          <a:p>
+            <a:r>
+              <a:rPr lang="en-GB" sz="1050" dirty="0"/>
+              <a:t>AP=false</a:t>
+            </a:r>
+          </a:p>
+          <a:p>
+            <a:r>
+              <a:rPr lang="en-GB" sz="1050" dirty="0"/>
+              <a:t>STA=false</a:t>
+            </a:r>
+            <a:endParaRPr lang="en-NL" sz="1050" dirty="0"/>
+          </a:p>
+        </p:txBody>
+      </p:sp>
+      <p:sp>
+        <p:nvSpPr>
+          <p:cNvPr id="9" name="TextBox 8">
+            <a:extLst>
+              <a:ext uri="{FF2B5EF4-FFF2-40B4-BE49-F238E27FC236}">
+                <a16:creationId xmlns:a16="http://schemas.microsoft.com/office/drawing/2014/main" id="{7EA01405-C5FB-B365-2D7D-2221B65CA183}"/>
+              </a:ext>
+            </a:extLst>
+          </p:cNvPr>
+          <p:cNvSpPr txBox="1"/>
+          <p:nvPr/>
+        </p:nvSpPr>
+        <p:spPr>
+          <a:xfrm>
+            <a:off x="2099191" y="1680873"/>
+            <a:ext cx="662361" cy="415498"/>
+          </a:xfrm>
+          <a:prstGeom prst="rect">
+            <a:avLst/>
+          </a:prstGeom>
+          <a:noFill/>
+        </p:spPr>
+        <p:txBody>
+          <a:bodyPr wrap="none" rtlCol="0">
+            <a:spAutoFit/>
+          </a:bodyPr>
+          <a:lstStyle/>
+          <a:p>
+            <a:r>
+              <a:rPr lang="en-GB" sz="1050" dirty="0" err="1"/>
+              <a:t>Start_AP</a:t>
+            </a:r>
+            <a:endParaRPr lang="en-GB" sz="1050" dirty="0"/>
+          </a:p>
+          <a:p>
+            <a:r>
+              <a:rPr lang="en-GB" sz="1050" dirty="0"/>
+              <a:t>AP=true</a:t>
+            </a:r>
+          </a:p>
+        </p:txBody>
+      </p:sp>
+      <p:cxnSp>
+        <p:nvCxnSpPr>
+          <p:cNvPr id="17" name="Elbow Connector 16">
+            <a:extLst>
+              <a:ext uri="{FF2B5EF4-FFF2-40B4-BE49-F238E27FC236}">
+                <a16:creationId xmlns:a16="http://schemas.microsoft.com/office/drawing/2014/main" id="{D647C47E-F3E8-D9DD-F3E2-0CABE33EA999}"/>
+              </a:ext>
+            </a:extLst>
+          </p:cNvPr>
+          <p:cNvCxnSpPr>
+            <a:cxnSpLocks/>
+            <a:stCxn id="5" idx="1"/>
+            <a:endCxn id="5" idx="2"/>
+          </p:cNvCxnSpPr>
+          <p:nvPr/>
+        </p:nvCxnSpPr>
+        <p:spPr>
+          <a:xfrm rot="10800000" flipH="1" flipV="1">
+            <a:off x="1555897" y="2863702"/>
+            <a:ext cx="538716" cy="184297"/>
+          </a:xfrm>
+          <a:prstGeom prst="bentConnector4">
+            <a:avLst>
+              <a:gd name="adj1" fmla="val -224012"/>
+              <a:gd name="adj2" fmla="val 235577"/>
+            </a:avLst>
+          </a:prstGeom>
+          <a:ln w="38100">
+            <a:tailEnd type="triangle"/>
+          </a:ln>
+        </p:spPr>
+        <p:style>
+          <a:lnRef idx="1">
+            <a:schemeClr val="accent1"/>
+          </a:lnRef>
+          <a:fillRef idx="0">
+            <a:schemeClr val="accent1"/>
+          </a:fillRef>
+          <a:effectRef idx="0">
+            <a:schemeClr val="accent1"/>
+          </a:effectRef>
+          <a:fontRef idx="minor">
+            <a:schemeClr val="tx1"/>
+          </a:fontRef>
+        </p:style>
+      </p:cxnSp>
+      <p:sp>
+        <p:nvSpPr>
+          <p:cNvPr id="18" name="TextBox 17">
+            <a:extLst>
+              <a:ext uri="{FF2B5EF4-FFF2-40B4-BE49-F238E27FC236}">
+                <a16:creationId xmlns:a16="http://schemas.microsoft.com/office/drawing/2014/main" id="{A28C0ED9-DE43-75A7-551E-A2ACC69AC96D}"/>
+              </a:ext>
+            </a:extLst>
+          </p:cNvPr>
+          <p:cNvSpPr txBox="1"/>
+          <p:nvPr/>
+        </p:nvSpPr>
+        <p:spPr>
+          <a:xfrm>
+            <a:off x="345335" y="3013375"/>
+            <a:ext cx="1701107" cy="738664"/>
+          </a:xfrm>
+          <a:prstGeom prst="rect">
+            <a:avLst/>
+          </a:prstGeom>
+          <a:noFill/>
+        </p:spPr>
+        <p:txBody>
+          <a:bodyPr wrap="none" rtlCol="0">
+            <a:spAutoFit/>
+          </a:bodyPr>
+          <a:lstStyle/>
+          <a:p>
+            <a:r>
+              <a:rPr lang="en-GB" sz="1050" dirty="0"/>
+              <a:t>AP=true &amp; TO &amp; </a:t>
+            </a:r>
+            <a:r>
+              <a:rPr lang="en-GB" sz="1050" dirty="0" err="1"/>
+              <a:t>APchanged</a:t>
+            </a:r>
+            <a:endParaRPr lang="en-GB" sz="1050" dirty="0"/>
+          </a:p>
+          <a:p>
+            <a:endParaRPr lang="en-GB" sz="1050" dirty="0"/>
+          </a:p>
+          <a:p>
+            <a:r>
+              <a:rPr lang="en-GB" sz="1050" dirty="0" err="1"/>
+              <a:t>stopAP</a:t>
+            </a:r>
+            <a:r>
+              <a:rPr lang="en-GB" sz="1050" dirty="0"/>
+              <a:t>, </a:t>
+            </a:r>
+            <a:r>
+              <a:rPr lang="en-GB" sz="1050" dirty="0" err="1"/>
+              <a:t>startAP</a:t>
+            </a:r>
+            <a:endParaRPr lang="en-GB" sz="1050" dirty="0"/>
+          </a:p>
+          <a:p>
+            <a:r>
+              <a:rPr lang="en-GB" sz="1050" dirty="0"/>
+              <a:t>AP=true</a:t>
+            </a:r>
+          </a:p>
+        </p:txBody>
+      </p:sp>
+      <p:sp>
+        <p:nvSpPr>
+          <p:cNvPr id="21" name="Rounded Rectangle 20">
+            <a:extLst>
+              <a:ext uri="{FF2B5EF4-FFF2-40B4-BE49-F238E27FC236}">
+                <a16:creationId xmlns:a16="http://schemas.microsoft.com/office/drawing/2014/main" id="{09AD7397-71DF-863E-B9CA-6A7FCD2DB4AB}"/>
+              </a:ext>
+            </a:extLst>
+          </p:cNvPr>
+          <p:cNvSpPr/>
+          <p:nvPr/>
+        </p:nvSpPr>
+        <p:spPr>
+          <a:xfrm>
+            <a:off x="4132520" y="2573079"/>
+            <a:ext cx="1318438" cy="577081"/>
+          </a:xfrm>
+          <a:prstGeom prst="roundRect">
+            <a:avLst/>
+          </a:prstGeom>
+        </p:spPr>
+        <p:style>
+          <a:lnRef idx="2">
+            <a:schemeClr val="accent5">
+              <a:shade val="15000"/>
+            </a:schemeClr>
+          </a:lnRef>
+          <a:fillRef idx="1">
+            <a:schemeClr val="accent5"/>
+          </a:fillRef>
+          <a:effectRef idx="0">
+            <a:schemeClr val="accent5"/>
+          </a:effectRef>
+          <a:fontRef idx="minor">
+            <a:schemeClr val="lt1"/>
+          </a:fontRef>
+        </p:style>
+        <p:txBody>
+          <a:bodyPr rtlCol="0" anchor="ctr"/>
+          <a:lstStyle/>
+          <a:p>
+            <a:pPr algn="ctr"/>
+            <a:r>
+              <a:rPr lang="en-NL" sz="1200" dirty="0"/>
+              <a:t>AP=x</a:t>
+            </a:r>
+            <a:br>
+              <a:rPr lang="en-NL" sz="1200" dirty="0"/>
+            </a:br>
+            <a:r>
+              <a:rPr lang="en-NL" sz="1200" dirty="0"/>
+              <a:t>STA=false connecting</a:t>
+            </a:r>
+          </a:p>
+        </p:txBody>
+      </p:sp>
+      <p:cxnSp>
+        <p:nvCxnSpPr>
+          <p:cNvPr id="22" name="Elbow Connector 21">
+            <a:extLst>
+              <a:ext uri="{FF2B5EF4-FFF2-40B4-BE49-F238E27FC236}">
+                <a16:creationId xmlns:a16="http://schemas.microsoft.com/office/drawing/2014/main" id="{0EFD51E9-A84D-A3BD-12BA-DE1C970C3E98}"/>
+              </a:ext>
+            </a:extLst>
+          </p:cNvPr>
+          <p:cNvCxnSpPr>
+            <a:cxnSpLocks/>
+            <a:stCxn id="5" idx="3"/>
+            <a:endCxn id="21" idx="1"/>
+          </p:cNvCxnSpPr>
+          <p:nvPr/>
+        </p:nvCxnSpPr>
+        <p:spPr>
+          <a:xfrm flipV="1">
+            <a:off x="2633329" y="2861620"/>
+            <a:ext cx="1499191" cy="2083"/>
+          </a:xfrm>
+          <a:prstGeom prst="bentConnector3">
+            <a:avLst>
+              <a:gd name="adj1" fmla="val 50000"/>
+            </a:avLst>
+          </a:prstGeom>
+          <a:ln w="38100">
+            <a:tailEnd type="triangle"/>
+          </a:ln>
+        </p:spPr>
+        <p:style>
+          <a:lnRef idx="1">
+            <a:schemeClr val="accent1"/>
+          </a:lnRef>
+          <a:fillRef idx="0">
+            <a:schemeClr val="accent1"/>
+          </a:fillRef>
+          <a:effectRef idx="0">
+            <a:schemeClr val="accent1"/>
+          </a:effectRef>
+          <a:fontRef idx="minor">
+            <a:schemeClr val="tx1"/>
+          </a:fontRef>
+        </p:style>
+      </p:cxnSp>
+      <p:sp>
+        <p:nvSpPr>
+          <p:cNvPr id="25" name="TextBox 24">
+            <a:extLst>
+              <a:ext uri="{FF2B5EF4-FFF2-40B4-BE49-F238E27FC236}">
+                <a16:creationId xmlns:a16="http://schemas.microsoft.com/office/drawing/2014/main" id="{49946261-F549-EEA5-FBB5-F498008B3853}"/>
+              </a:ext>
+            </a:extLst>
+          </p:cNvPr>
+          <p:cNvSpPr txBox="1"/>
+          <p:nvPr/>
+        </p:nvSpPr>
+        <p:spPr>
+          <a:xfrm>
+            <a:off x="2597242" y="2377728"/>
+            <a:ext cx="1529586" cy="738664"/>
+          </a:xfrm>
+          <a:prstGeom prst="rect">
+            <a:avLst/>
+          </a:prstGeom>
+          <a:noFill/>
+        </p:spPr>
+        <p:txBody>
+          <a:bodyPr wrap="none" rtlCol="0">
+            <a:spAutoFit/>
+          </a:bodyPr>
+          <a:lstStyle/>
+          <a:p>
+            <a:r>
+              <a:rPr lang="en-GB" sz="1050" dirty="0"/>
+              <a:t>[TO &amp; STA credentials ||</a:t>
+            </a:r>
+            <a:br>
+              <a:rPr lang="en-GB" sz="1050" dirty="0"/>
+            </a:br>
+            <a:r>
+              <a:rPr lang="en-GB" sz="1050" dirty="0"/>
+              <a:t>STA credentials change]</a:t>
+            </a:r>
+          </a:p>
+          <a:p>
+            <a:endParaRPr lang="en-GB" sz="1050" dirty="0"/>
+          </a:p>
+          <a:p>
+            <a:r>
+              <a:rPr lang="en-GB" sz="1050" dirty="0" err="1"/>
+              <a:t>startSTA</a:t>
+            </a:r>
+            <a:endParaRPr lang="en-GB" sz="1050" dirty="0"/>
+          </a:p>
+        </p:txBody>
+      </p:sp>
+      <p:cxnSp>
+        <p:nvCxnSpPr>
+          <p:cNvPr id="31" name="Elbow Connector 30">
+            <a:extLst>
+              <a:ext uri="{FF2B5EF4-FFF2-40B4-BE49-F238E27FC236}">
+                <a16:creationId xmlns:a16="http://schemas.microsoft.com/office/drawing/2014/main" id="{63B32901-E35B-65D1-C1E5-44B50000BDA5}"/>
+              </a:ext>
+            </a:extLst>
+          </p:cNvPr>
+          <p:cNvCxnSpPr>
+            <a:cxnSpLocks/>
+            <a:stCxn id="21" idx="2"/>
+            <a:endCxn id="5" idx="2"/>
+          </p:cNvCxnSpPr>
+          <p:nvPr/>
+        </p:nvCxnSpPr>
+        <p:spPr>
+          <a:xfrm rot="5400000" flipH="1">
+            <a:off x="3392096" y="1750517"/>
+            <a:ext cx="102160" cy="2697126"/>
+          </a:xfrm>
+          <a:prstGeom prst="bentConnector3">
+            <a:avLst>
+              <a:gd name="adj1" fmla="val -556815"/>
+            </a:avLst>
+          </a:prstGeom>
+          <a:ln w="38100">
+            <a:tailEnd type="triangle"/>
+          </a:ln>
+        </p:spPr>
+        <p:style>
+          <a:lnRef idx="1">
+            <a:schemeClr val="accent1"/>
+          </a:lnRef>
+          <a:fillRef idx="0">
+            <a:schemeClr val="accent1"/>
+          </a:fillRef>
+          <a:effectRef idx="0">
+            <a:schemeClr val="accent1"/>
+          </a:effectRef>
+          <a:fontRef idx="minor">
+            <a:schemeClr val="tx1"/>
+          </a:fontRef>
+        </p:style>
+      </p:cxnSp>
+      <p:sp>
+        <p:nvSpPr>
+          <p:cNvPr id="35" name="TextBox 34">
+            <a:extLst>
+              <a:ext uri="{FF2B5EF4-FFF2-40B4-BE49-F238E27FC236}">
+                <a16:creationId xmlns:a16="http://schemas.microsoft.com/office/drawing/2014/main" id="{734F3C2B-DEB7-D87B-4346-F64C2D0AE1ED}"/>
+              </a:ext>
+            </a:extLst>
+          </p:cNvPr>
+          <p:cNvSpPr txBox="1"/>
+          <p:nvPr/>
+        </p:nvSpPr>
+        <p:spPr>
+          <a:xfrm>
+            <a:off x="3549892" y="3498123"/>
+            <a:ext cx="1228221" cy="738664"/>
+          </a:xfrm>
+          <a:prstGeom prst="rect">
+            <a:avLst/>
+          </a:prstGeom>
+          <a:noFill/>
+        </p:spPr>
+        <p:txBody>
+          <a:bodyPr wrap="none" rtlCol="0">
+            <a:spAutoFit/>
+          </a:bodyPr>
+          <a:lstStyle/>
+          <a:p>
+            <a:r>
+              <a:rPr lang="en-GB" sz="1050" dirty="0"/>
+              <a:t>STA connect fails</a:t>
+            </a:r>
+          </a:p>
+          <a:p>
+            <a:endParaRPr lang="en-GB" sz="1050" dirty="0"/>
+          </a:p>
+          <a:p>
+            <a:r>
+              <a:rPr lang="en-GB" sz="1050" dirty="0"/>
+              <a:t>If AP=false: </a:t>
+            </a:r>
+            <a:r>
+              <a:rPr lang="en-GB" sz="1050" dirty="0" err="1"/>
+              <a:t>startAP</a:t>
+            </a:r>
+            <a:endParaRPr lang="en-GB" sz="1050" dirty="0"/>
+          </a:p>
+          <a:p>
+            <a:r>
+              <a:rPr lang="en-GB" sz="1050" dirty="0"/>
+              <a:t>AP=true</a:t>
+            </a:r>
+          </a:p>
+        </p:txBody>
+      </p:sp>
+      <p:sp>
+        <p:nvSpPr>
+          <p:cNvPr id="39" name="Rounded Rectangle 38">
+            <a:extLst>
+              <a:ext uri="{FF2B5EF4-FFF2-40B4-BE49-F238E27FC236}">
+                <a16:creationId xmlns:a16="http://schemas.microsoft.com/office/drawing/2014/main" id="{365E69CD-C02E-6AD4-DE66-2BB1E2CBC36C}"/>
+              </a:ext>
+            </a:extLst>
+          </p:cNvPr>
+          <p:cNvSpPr/>
+          <p:nvPr/>
+        </p:nvSpPr>
+        <p:spPr>
+          <a:xfrm>
+            <a:off x="6455733" y="2569495"/>
+            <a:ext cx="1201474" cy="577081"/>
+          </a:xfrm>
+          <a:prstGeom prst="roundRect">
+            <a:avLst/>
+          </a:prstGeom>
+        </p:spPr>
+        <p:style>
+          <a:lnRef idx="2">
+            <a:schemeClr val="accent5">
+              <a:shade val="15000"/>
+            </a:schemeClr>
+          </a:lnRef>
+          <a:fillRef idx="1">
+            <a:schemeClr val="accent5"/>
+          </a:fillRef>
+          <a:effectRef idx="0">
+            <a:schemeClr val="accent5"/>
+          </a:effectRef>
+          <a:fontRef idx="minor">
+            <a:schemeClr val="lt1"/>
+          </a:fontRef>
+        </p:style>
+        <p:txBody>
+          <a:bodyPr rtlCol="0" anchor="ctr"/>
+          <a:lstStyle/>
+          <a:p>
+            <a:pPr algn="ctr"/>
+            <a:r>
+              <a:rPr lang="en-NL" sz="1200" dirty="0"/>
+              <a:t>STA=true</a:t>
+            </a:r>
+          </a:p>
+          <a:p>
+            <a:pPr algn="ctr"/>
+            <a:r>
+              <a:rPr lang="en-NL" sz="1200" dirty="0"/>
+              <a:t>AP=true</a:t>
+            </a:r>
+          </a:p>
+        </p:txBody>
+      </p:sp>
+      <p:cxnSp>
+        <p:nvCxnSpPr>
+          <p:cNvPr id="46" name="Elbow Connector 45">
+            <a:extLst>
+              <a:ext uri="{FF2B5EF4-FFF2-40B4-BE49-F238E27FC236}">
+                <a16:creationId xmlns:a16="http://schemas.microsoft.com/office/drawing/2014/main" id="{F7F14D78-AB26-9ABE-BFA5-5C3920E027AE}"/>
+              </a:ext>
+            </a:extLst>
+          </p:cNvPr>
+          <p:cNvCxnSpPr>
+            <a:cxnSpLocks/>
+            <a:stCxn id="21" idx="3"/>
+            <a:endCxn id="39" idx="1"/>
+          </p:cNvCxnSpPr>
+          <p:nvPr/>
+        </p:nvCxnSpPr>
+        <p:spPr>
+          <a:xfrm flipV="1">
+            <a:off x="5450958" y="2858036"/>
+            <a:ext cx="1004775" cy="3584"/>
+          </a:xfrm>
+          <a:prstGeom prst="bentConnector3">
+            <a:avLst>
+              <a:gd name="adj1" fmla="val 50000"/>
+            </a:avLst>
+          </a:prstGeom>
+          <a:ln w="38100">
+            <a:tailEnd type="triangle"/>
+          </a:ln>
+        </p:spPr>
+        <p:style>
+          <a:lnRef idx="1">
+            <a:schemeClr val="accent1"/>
+          </a:lnRef>
+          <a:fillRef idx="0">
+            <a:schemeClr val="accent1"/>
+          </a:fillRef>
+          <a:effectRef idx="0">
+            <a:schemeClr val="accent1"/>
+          </a:effectRef>
+          <a:fontRef idx="minor">
+            <a:schemeClr val="tx1"/>
+          </a:fontRef>
+        </p:style>
+      </p:cxnSp>
+      <p:sp>
+        <p:nvSpPr>
+          <p:cNvPr id="50" name="TextBox 49">
+            <a:extLst>
+              <a:ext uri="{FF2B5EF4-FFF2-40B4-BE49-F238E27FC236}">
+                <a16:creationId xmlns:a16="http://schemas.microsoft.com/office/drawing/2014/main" id="{E85B867C-BCB5-F7B7-CB69-37501BD166CF}"/>
+              </a:ext>
+            </a:extLst>
+          </p:cNvPr>
+          <p:cNvSpPr txBox="1"/>
+          <p:nvPr/>
+        </p:nvSpPr>
+        <p:spPr>
+          <a:xfrm>
+            <a:off x="5514755" y="2579403"/>
+            <a:ext cx="776175" cy="577081"/>
+          </a:xfrm>
+          <a:prstGeom prst="rect">
+            <a:avLst/>
+          </a:prstGeom>
+          <a:noFill/>
+        </p:spPr>
+        <p:txBody>
+          <a:bodyPr wrap="none" rtlCol="0">
+            <a:spAutoFit/>
+          </a:bodyPr>
+          <a:lstStyle/>
+          <a:p>
+            <a:r>
+              <a:rPr lang="en-GB" sz="1050" dirty="0"/>
+              <a:t>Connected</a:t>
+            </a:r>
+          </a:p>
+          <a:p>
+            <a:endParaRPr lang="en-GB" sz="1050" dirty="0"/>
+          </a:p>
+          <a:p>
+            <a:r>
+              <a:rPr lang="en-GB" sz="1050" dirty="0"/>
+              <a:t>STA=true</a:t>
+            </a:r>
+          </a:p>
+        </p:txBody>
+      </p:sp>
+      <p:sp>
+        <p:nvSpPr>
+          <p:cNvPr id="53" name="Rounded Rectangle 52">
+            <a:extLst>
+              <a:ext uri="{FF2B5EF4-FFF2-40B4-BE49-F238E27FC236}">
+                <a16:creationId xmlns:a16="http://schemas.microsoft.com/office/drawing/2014/main" id="{0D0E66B1-84F0-6E15-26BD-810420BCD409}"/>
+              </a:ext>
+            </a:extLst>
+          </p:cNvPr>
+          <p:cNvSpPr/>
+          <p:nvPr/>
+        </p:nvSpPr>
+        <p:spPr>
+          <a:xfrm>
+            <a:off x="8588578" y="2564909"/>
+            <a:ext cx="1201474" cy="577081"/>
+          </a:xfrm>
+          <a:prstGeom prst="roundRect">
+            <a:avLst/>
+          </a:prstGeom>
+        </p:spPr>
+        <p:style>
+          <a:lnRef idx="2">
+            <a:schemeClr val="accent5">
+              <a:shade val="15000"/>
+            </a:schemeClr>
+          </a:lnRef>
+          <a:fillRef idx="1">
+            <a:schemeClr val="accent5"/>
+          </a:fillRef>
+          <a:effectRef idx="0">
+            <a:schemeClr val="accent5"/>
+          </a:effectRef>
+          <a:fontRef idx="minor">
+            <a:schemeClr val="lt1"/>
+          </a:fontRef>
+        </p:style>
+        <p:txBody>
+          <a:bodyPr rtlCol="0" anchor="ctr"/>
+          <a:lstStyle/>
+          <a:p>
+            <a:pPr algn="ctr"/>
+            <a:r>
+              <a:rPr lang="en-NL" sz="1200" dirty="0"/>
+              <a:t>STA=true</a:t>
+            </a:r>
+          </a:p>
+          <a:p>
+            <a:pPr algn="ctr"/>
+            <a:r>
+              <a:rPr lang="en-NL" sz="1200" dirty="0"/>
+              <a:t>AP=false</a:t>
+            </a:r>
+          </a:p>
+        </p:txBody>
+      </p:sp>
+      <p:cxnSp>
+        <p:nvCxnSpPr>
+          <p:cNvPr id="54" name="Elbow Connector 53">
+            <a:extLst>
+              <a:ext uri="{FF2B5EF4-FFF2-40B4-BE49-F238E27FC236}">
+                <a16:creationId xmlns:a16="http://schemas.microsoft.com/office/drawing/2014/main" id="{61F2773F-C593-A06C-B155-205B7BE7C934}"/>
+              </a:ext>
+            </a:extLst>
+          </p:cNvPr>
+          <p:cNvCxnSpPr>
+            <a:cxnSpLocks/>
+            <a:stCxn id="39" idx="3"/>
+            <a:endCxn id="53" idx="1"/>
+          </p:cNvCxnSpPr>
+          <p:nvPr/>
+        </p:nvCxnSpPr>
+        <p:spPr>
+          <a:xfrm flipV="1">
+            <a:off x="7657207" y="2853450"/>
+            <a:ext cx="931371" cy="4586"/>
+          </a:xfrm>
+          <a:prstGeom prst="bentConnector3">
+            <a:avLst>
+              <a:gd name="adj1" fmla="val 50000"/>
+            </a:avLst>
+          </a:prstGeom>
+          <a:ln w="38100">
+            <a:tailEnd type="triangle"/>
+          </a:ln>
+        </p:spPr>
+        <p:style>
+          <a:lnRef idx="1">
+            <a:schemeClr val="accent1"/>
+          </a:lnRef>
+          <a:fillRef idx="0">
+            <a:schemeClr val="accent1"/>
+          </a:fillRef>
+          <a:effectRef idx="0">
+            <a:schemeClr val="accent1"/>
+          </a:effectRef>
+          <a:fontRef idx="minor">
+            <a:schemeClr val="tx1"/>
+          </a:fontRef>
+        </p:style>
+      </p:cxnSp>
+      <p:sp>
+        <p:nvSpPr>
+          <p:cNvPr id="55" name="TextBox 54">
+            <a:extLst>
+              <a:ext uri="{FF2B5EF4-FFF2-40B4-BE49-F238E27FC236}">
+                <a16:creationId xmlns:a16="http://schemas.microsoft.com/office/drawing/2014/main" id="{0AF52E57-96FF-E991-D48A-9803FFAE74AA}"/>
+              </a:ext>
+            </a:extLst>
+          </p:cNvPr>
+          <p:cNvSpPr txBox="1"/>
+          <p:nvPr/>
+        </p:nvSpPr>
+        <p:spPr>
+          <a:xfrm>
+            <a:off x="7657207" y="2573079"/>
+            <a:ext cx="1004775" cy="738664"/>
+          </a:xfrm>
+          <a:prstGeom prst="rect">
+            <a:avLst/>
+          </a:prstGeom>
+          <a:noFill/>
+        </p:spPr>
+        <p:txBody>
+          <a:bodyPr wrap="square" rtlCol="0">
+            <a:spAutoFit/>
+          </a:bodyPr>
+          <a:lstStyle/>
+          <a:p>
+            <a:r>
+              <a:rPr lang="en-GB" sz="1050" dirty="0"/>
+              <a:t>STA=true &amp;TO</a:t>
+            </a:r>
+          </a:p>
+          <a:p>
+            <a:endParaRPr lang="en-GB" sz="1050" dirty="0"/>
+          </a:p>
+          <a:p>
+            <a:r>
+              <a:rPr lang="en-GB" sz="1050" dirty="0" err="1"/>
+              <a:t>stopAP</a:t>
+            </a:r>
+            <a:endParaRPr lang="en-GB" sz="1050" dirty="0"/>
+          </a:p>
+          <a:p>
+            <a:r>
+              <a:rPr lang="en-GB" sz="1050" dirty="0"/>
+              <a:t>AP=false</a:t>
+            </a:r>
+          </a:p>
+        </p:txBody>
+      </p:sp>
+      <p:cxnSp>
+        <p:nvCxnSpPr>
+          <p:cNvPr id="64" name="Elbow Connector 63">
+            <a:extLst>
+              <a:ext uri="{FF2B5EF4-FFF2-40B4-BE49-F238E27FC236}">
+                <a16:creationId xmlns:a16="http://schemas.microsoft.com/office/drawing/2014/main" id="{1305EF6C-9923-770B-85F5-E5EBAAB95760}"/>
+              </a:ext>
+            </a:extLst>
+          </p:cNvPr>
+          <p:cNvCxnSpPr>
+            <a:cxnSpLocks/>
+            <a:stCxn id="53" idx="3"/>
+            <a:endCxn id="53" idx="0"/>
+          </p:cNvCxnSpPr>
+          <p:nvPr/>
+        </p:nvCxnSpPr>
+        <p:spPr>
+          <a:xfrm flipH="1" flipV="1">
+            <a:off x="9189315" y="2564909"/>
+            <a:ext cx="600737" cy="288541"/>
+          </a:xfrm>
+          <a:prstGeom prst="bentConnector4">
+            <a:avLst>
+              <a:gd name="adj1" fmla="val -38053"/>
+              <a:gd name="adj2" fmla="val 179226"/>
+            </a:avLst>
+          </a:prstGeom>
+          <a:ln w="38100">
+            <a:tailEnd type="triangle"/>
+          </a:ln>
+        </p:spPr>
+        <p:style>
+          <a:lnRef idx="1">
+            <a:schemeClr val="accent1"/>
+          </a:lnRef>
+          <a:fillRef idx="0">
+            <a:schemeClr val="accent1"/>
+          </a:fillRef>
+          <a:effectRef idx="0">
+            <a:schemeClr val="accent1"/>
+          </a:effectRef>
+          <a:fontRef idx="minor">
+            <a:schemeClr val="tx1"/>
+          </a:fontRef>
+        </p:style>
+      </p:cxnSp>
+      <p:sp>
+        <p:nvSpPr>
+          <p:cNvPr id="67" name="TextBox 66">
+            <a:extLst>
+              <a:ext uri="{FF2B5EF4-FFF2-40B4-BE49-F238E27FC236}">
+                <a16:creationId xmlns:a16="http://schemas.microsoft.com/office/drawing/2014/main" id="{14964236-E088-7D3F-A813-D561B4C02632}"/>
+              </a:ext>
+            </a:extLst>
+          </p:cNvPr>
+          <p:cNvSpPr txBox="1"/>
+          <p:nvPr/>
+        </p:nvSpPr>
+        <p:spPr>
+          <a:xfrm>
+            <a:off x="9102399" y="2134130"/>
+            <a:ext cx="340158" cy="253916"/>
+          </a:xfrm>
+          <a:prstGeom prst="rect">
+            <a:avLst/>
+          </a:prstGeom>
+          <a:noFill/>
+        </p:spPr>
+        <p:txBody>
+          <a:bodyPr wrap="none" rtlCol="0">
+            <a:spAutoFit/>
+          </a:bodyPr>
+          <a:lstStyle/>
+          <a:p>
+            <a:r>
+              <a:rPr lang="en-GB" sz="1050" dirty="0"/>
+              <a:t>TO</a:t>
+            </a:r>
+          </a:p>
+        </p:txBody>
+      </p:sp>
+      <p:cxnSp>
+        <p:nvCxnSpPr>
+          <p:cNvPr id="68" name="Elbow Connector 67">
+            <a:extLst>
+              <a:ext uri="{FF2B5EF4-FFF2-40B4-BE49-F238E27FC236}">
+                <a16:creationId xmlns:a16="http://schemas.microsoft.com/office/drawing/2014/main" id="{96ABC89D-08F9-7EF1-64D2-F3C9959889F6}"/>
+              </a:ext>
+            </a:extLst>
+          </p:cNvPr>
+          <p:cNvCxnSpPr>
+            <a:cxnSpLocks/>
+            <a:stCxn id="53" idx="3"/>
+            <a:endCxn id="21" idx="2"/>
+          </p:cNvCxnSpPr>
+          <p:nvPr/>
+        </p:nvCxnSpPr>
+        <p:spPr>
+          <a:xfrm flipH="1">
+            <a:off x="4791739" y="2853450"/>
+            <a:ext cx="4998313" cy="296710"/>
+          </a:xfrm>
+          <a:prstGeom prst="bentConnector4">
+            <a:avLst>
+              <a:gd name="adj1" fmla="val -4574"/>
+              <a:gd name="adj2" fmla="val 415944"/>
+            </a:avLst>
+          </a:prstGeom>
+          <a:ln w="38100">
+            <a:tailEnd type="triangle"/>
+          </a:ln>
+        </p:spPr>
+        <p:style>
+          <a:lnRef idx="1">
+            <a:schemeClr val="accent1"/>
+          </a:lnRef>
+          <a:fillRef idx="0">
+            <a:schemeClr val="accent1"/>
+          </a:fillRef>
+          <a:effectRef idx="0">
+            <a:schemeClr val="accent1"/>
+          </a:effectRef>
+          <a:fontRef idx="minor">
+            <a:schemeClr val="tx1"/>
+          </a:fontRef>
+        </p:style>
+      </p:cxnSp>
+      <p:sp>
+        <p:nvSpPr>
+          <p:cNvPr id="72" name="TextBox 71">
+            <a:extLst>
+              <a:ext uri="{FF2B5EF4-FFF2-40B4-BE49-F238E27FC236}">
+                <a16:creationId xmlns:a16="http://schemas.microsoft.com/office/drawing/2014/main" id="{FE4585D0-50F5-8AB0-18C9-E454B5A9CBB3}"/>
+              </a:ext>
+            </a:extLst>
+          </p:cNvPr>
+          <p:cNvSpPr txBox="1"/>
+          <p:nvPr/>
+        </p:nvSpPr>
+        <p:spPr>
+          <a:xfrm>
+            <a:off x="5293364" y="3498123"/>
+            <a:ext cx="1718927" cy="1223412"/>
+          </a:xfrm>
+          <a:prstGeom prst="rect">
+            <a:avLst/>
+          </a:prstGeom>
+          <a:noFill/>
+        </p:spPr>
+        <p:txBody>
+          <a:bodyPr wrap="square" rtlCol="0">
+            <a:spAutoFit/>
+          </a:bodyPr>
+          <a:lstStyle/>
+          <a:p>
+            <a:r>
+              <a:rPr lang="en-GB" sz="1050" dirty="0"/>
+              <a:t>STA=true &amp;&amp;</a:t>
+            </a:r>
+            <a:br>
+              <a:rPr lang="en-GB" sz="1050" dirty="0"/>
+            </a:br>
+            <a:r>
+              <a:rPr lang="en-GB" sz="1050" dirty="0"/>
+              <a:t>[STA Connect lost || </a:t>
+            </a:r>
+            <a:br>
+              <a:rPr lang="en-GB" sz="1050" dirty="0"/>
+            </a:br>
+            <a:r>
+              <a:rPr lang="en-GB" sz="1050" dirty="0"/>
+              <a:t>STA credentials change]</a:t>
+            </a:r>
+          </a:p>
+          <a:p>
+            <a:endParaRPr lang="en-GB" sz="1050" dirty="0"/>
+          </a:p>
+          <a:p>
+            <a:r>
+              <a:rPr lang="en-GB" sz="1050" dirty="0" err="1"/>
+              <a:t>stopSTA</a:t>
+            </a:r>
+            <a:endParaRPr lang="en-GB" sz="1050" dirty="0"/>
+          </a:p>
+          <a:p>
+            <a:r>
+              <a:rPr lang="en-GB" sz="1050" dirty="0"/>
+              <a:t>STA=false</a:t>
+            </a:r>
+          </a:p>
+          <a:p>
+            <a:r>
+              <a:rPr lang="en-GB" sz="1050" dirty="0" err="1"/>
+              <a:t>startSTA</a:t>
+            </a:r>
+            <a:endParaRPr lang="en-GB" sz="1050" dirty="0"/>
+          </a:p>
+        </p:txBody>
+      </p:sp>
+      <p:cxnSp>
+        <p:nvCxnSpPr>
+          <p:cNvPr id="112" name="Elbow Connector 111">
+            <a:extLst>
+              <a:ext uri="{FF2B5EF4-FFF2-40B4-BE49-F238E27FC236}">
+                <a16:creationId xmlns:a16="http://schemas.microsoft.com/office/drawing/2014/main" id="{BD6B12FB-0E86-38B5-2EC7-0B6B2C3E6EB2}"/>
+              </a:ext>
+            </a:extLst>
+          </p:cNvPr>
+          <p:cNvCxnSpPr>
+            <a:cxnSpLocks/>
+            <a:stCxn id="39" idx="2"/>
+            <a:endCxn id="21" idx="2"/>
+          </p:cNvCxnSpPr>
+          <p:nvPr/>
+        </p:nvCxnSpPr>
+        <p:spPr>
+          <a:xfrm rot="5400000">
+            <a:off x="5922313" y="2016003"/>
+            <a:ext cx="3584" cy="2264731"/>
+          </a:xfrm>
+          <a:prstGeom prst="bentConnector3">
+            <a:avLst>
+              <a:gd name="adj1" fmla="val 26256166"/>
+            </a:avLst>
+          </a:prstGeom>
+          <a:ln w="38100">
+            <a:tailEnd type="triangle"/>
+          </a:ln>
+        </p:spPr>
+        <p:style>
+          <a:lnRef idx="1">
+            <a:schemeClr val="accent1"/>
+          </a:lnRef>
+          <a:fillRef idx="0">
+            <a:schemeClr val="accent1"/>
+          </a:fillRef>
+          <a:effectRef idx="0">
+            <a:schemeClr val="accent1"/>
+          </a:effectRef>
+          <a:fontRef idx="minor">
+            <a:schemeClr val="tx1"/>
+          </a:fontRef>
+        </p:style>
+      </p:cxnSp>
+      <p:cxnSp>
+        <p:nvCxnSpPr>
+          <p:cNvPr id="126" name="Elbow Connector 125">
+            <a:extLst>
+              <a:ext uri="{FF2B5EF4-FFF2-40B4-BE49-F238E27FC236}">
+                <a16:creationId xmlns:a16="http://schemas.microsoft.com/office/drawing/2014/main" id="{9A541257-B946-A224-7F3F-967E724B7822}"/>
+              </a:ext>
+            </a:extLst>
+          </p:cNvPr>
+          <p:cNvCxnSpPr>
+            <a:cxnSpLocks/>
+            <a:stCxn id="4" idx="6"/>
+            <a:endCxn id="21" idx="0"/>
+          </p:cNvCxnSpPr>
+          <p:nvPr/>
+        </p:nvCxnSpPr>
+        <p:spPr>
+          <a:xfrm>
+            <a:off x="2204482" y="1522686"/>
+            <a:ext cx="2587257" cy="1050393"/>
+          </a:xfrm>
+          <a:prstGeom prst="bentConnector2">
+            <a:avLst/>
+          </a:prstGeom>
+          <a:ln w="38100">
+            <a:tailEnd type="triangle"/>
+          </a:ln>
+        </p:spPr>
+        <p:style>
+          <a:lnRef idx="1">
+            <a:schemeClr val="accent1"/>
+          </a:lnRef>
+          <a:fillRef idx="0">
+            <a:schemeClr val="accent1"/>
+          </a:fillRef>
+          <a:effectRef idx="0">
+            <a:schemeClr val="accent1"/>
+          </a:effectRef>
+          <a:fontRef idx="minor">
+            <a:schemeClr val="tx1"/>
+          </a:fontRef>
+        </p:style>
+      </p:cxnSp>
+      <p:sp>
+        <p:nvSpPr>
+          <p:cNvPr id="129" name="TextBox 128">
+            <a:extLst>
+              <a:ext uri="{FF2B5EF4-FFF2-40B4-BE49-F238E27FC236}">
+                <a16:creationId xmlns:a16="http://schemas.microsoft.com/office/drawing/2014/main" id="{AA2BDC5A-79EB-217C-5874-F15A11B49BAB}"/>
+              </a:ext>
+            </a:extLst>
+          </p:cNvPr>
+          <p:cNvSpPr txBox="1"/>
+          <p:nvPr/>
+        </p:nvSpPr>
+        <p:spPr>
+          <a:xfrm>
+            <a:off x="3593173" y="1073724"/>
+            <a:ext cx="1024639" cy="738664"/>
+          </a:xfrm>
+          <a:prstGeom prst="rect">
+            <a:avLst/>
+          </a:prstGeom>
+          <a:noFill/>
+        </p:spPr>
+        <p:txBody>
+          <a:bodyPr wrap="none" rtlCol="0">
+            <a:spAutoFit/>
+          </a:bodyPr>
+          <a:lstStyle/>
+          <a:p>
+            <a:r>
+              <a:rPr lang="en-GB" sz="1050" dirty="0"/>
+              <a:t>AP=false</a:t>
+            </a:r>
+          </a:p>
+          <a:p>
+            <a:r>
+              <a:rPr lang="en-GB" sz="1050" dirty="0"/>
+              <a:t>STA=false</a:t>
+            </a:r>
+          </a:p>
+          <a:p>
+            <a:endParaRPr lang="en-GB" sz="1050" dirty="0"/>
+          </a:p>
+          <a:p>
+            <a:r>
+              <a:rPr lang="en-GB" sz="1050" dirty="0"/>
+              <a:t>STA credentials</a:t>
+            </a:r>
+            <a:endParaRPr lang="en-NL" sz="1050" dirty="0"/>
+          </a:p>
+        </p:txBody>
+      </p:sp>
+    </p:spTree>
+    <p:extLst>
+      <p:ext uri="{BB962C8B-B14F-4D97-AF65-F5344CB8AC3E}">
+        <p14:creationId xmlns:p14="http://schemas.microsoft.com/office/powerpoint/2010/main" val="3118492507"/>
       </p:ext>
     </p:extLst>
   </p:cSld>

</xml_diff>

<commit_message>
OTA and error handling
OTA working
Error and status handling on status LED
Improved Status html page
</commit_message>
<xml_diff>
--- a/Oli.pptx
+++ b/Oli.pptx
@@ -5,15 +5,16 @@
     <p:sldMasterId id="2147483648" r:id="rId1"/>
   </p:sldMasterIdLst>
   <p:notesMasterIdLst>
-    <p:notesMasterId r:id="rId8"/>
+    <p:notesMasterId r:id="rId9"/>
   </p:notesMasterIdLst>
   <p:sldIdLst>
     <p:sldId id="256" r:id="rId2"/>
     <p:sldId id="257" r:id="rId3"/>
-    <p:sldId id="260" r:id="rId4"/>
-    <p:sldId id="261" r:id="rId5"/>
-    <p:sldId id="258" r:id="rId6"/>
-    <p:sldId id="262" r:id="rId7"/>
+    <p:sldId id="263" r:id="rId4"/>
+    <p:sldId id="260" r:id="rId5"/>
+    <p:sldId id="261" r:id="rId6"/>
+    <p:sldId id="258" r:id="rId7"/>
+    <p:sldId id="262" r:id="rId8"/>
   </p:sldIdLst>
   <p:sldSz cx="12192000" cy="6858000"/>
   <p:notesSz cx="6858000" cy="9144000"/>
@@ -202,7 +203,7 @@
           <a:p>
             <a:fld id="{960BDE04-FFF7-AF40-AF4F-D72359A71013}" type="datetimeFigureOut">
               <a:rPr lang="en-NL" smtClean="0"/>
-              <a:t>07/11/2023</a:t>
+              <a:t>19/11/2023</a:t>
             </a:fld>
             <a:endParaRPr lang="en-NL"/>
           </a:p>
@@ -703,7 +704,7 @@
           <a:p>
             <a:fld id="{738102A4-E71B-0447-A150-B4B7143CE932}" type="datetimeFigureOut">
               <a:rPr lang="en-NL" smtClean="0"/>
-              <a:t>07/11/2023</a:t>
+              <a:t>19/11/2023</a:t>
             </a:fld>
             <a:endParaRPr lang="en-NL"/>
           </a:p>
@@ -903,7 +904,7 @@
           <a:p>
             <a:fld id="{738102A4-E71B-0447-A150-B4B7143CE932}" type="datetimeFigureOut">
               <a:rPr lang="en-NL" smtClean="0"/>
-              <a:t>07/11/2023</a:t>
+              <a:t>19/11/2023</a:t>
             </a:fld>
             <a:endParaRPr lang="en-NL"/>
           </a:p>
@@ -1113,7 +1114,7 @@
           <a:p>
             <a:fld id="{738102A4-E71B-0447-A150-B4B7143CE932}" type="datetimeFigureOut">
               <a:rPr lang="en-NL" smtClean="0"/>
-              <a:t>07/11/2023</a:t>
+              <a:t>19/11/2023</a:t>
             </a:fld>
             <a:endParaRPr lang="en-NL"/>
           </a:p>
@@ -1313,7 +1314,7 @@
           <a:p>
             <a:fld id="{738102A4-E71B-0447-A150-B4B7143CE932}" type="datetimeFigureOut">
               <a:rPr lang="en-NL" smtClean="0"/>
-              <a:t>07/11/2023</a:t>
+              <a:t>19/11/2023</a:t>
             </a:fld>
             <a:endParaRPr lang="en-NL"/>
           </a:p>
@@ -1589,7 +1590,7 @@
           <a:p>
             <a:fld id="{738102A4-E71B-0447-A150-B4B7143CE932}" type="datetimeFigureOut">
               <a:rPr lang="en-NL" smtClean="0"/>
-              <a:t>07/11/2023</a:t>
+              <a:t>19/11/2023</a:t>
             </a:fld>
             <a:endParaRPr lang="en-NL"/>
           </a:p>
@@ -1857,7 +1858,7 @@
           <a:p>
             <a:fld id="{738102A4-E71B-0447-A150-B4B7143CE932}" type="datetimeFigureOut">
               <a:rPr lang="en-NL" smtClean="0"/>
-              <a:t>07/11/2023</a:t>
+              <a:t>19/11/2023</a:t>
             </a:fld>
             <a:endParaRPr lang="en-NL"/>
           </a:p>
@@ -2272,7 +2273,7 @@
           <a:p>
             <a:fld id="{738102A4-E71B-0447-A150-B4B7143CE932}" type="datetimeFigureOut">
               <a:rPr lang="en-NL" smtClean="0"/>
-              <a:t>07/11/2023</a:t>
+              <a:t>19/11/2023</a:t>
             </a:fld>
             <a:endParaRPr lang="en-NL"/>
           </a:p>
@@ -2414,7 +2415,7 @@
           <a:p>
             <a:fld id="{738102A4-E71B-0447-A150-B4B7143CE932}" type="datetimeFigureOut">
               <a:rPr lang="en-NL" smtClean="0"/>
-              <a:t>07/11/2023</a:t>
+              <a:t>19/11/2023</a:t>
             </a:fld>
             <a:endParaRPr lang="en-NL"/>
           </a:p>
@@ -2527,7 +2528,7 @@
           <a:p>
             <a:fld id="{738102A4-E71B-0447-A150-B4B7143CE932}" type="datetimeFigureOut">
               <a:rPr lang="en-NL" smtClean="0"/>
-              <a:t>07/11/2023</a:t>
+              <a:t>19/11/2023</a:t>
             </a:fld>
             <a:endParaRPr lang="en-NL"/>
           </a:p>
@@ -2840,7 +2841,7 @@
           <a:p>
             <a:fld id="{738102A4-E71B-0447-A150-B4B7143CE932}" type="datetimeFigureOut">
               <a:rPr lang="en-NL" smtClean="0"/>
-              <a:t>07/11/2023</a:t>
+              <a:t>19/11/2023</a:t>
             </a:fld>
             <a:endParaRPr lang="en-NL"/>
           </a:p>
@@ -3129,7 +3130,7 @@
           <a:p>
             <a:fld id="{738102A4-E71B-0447-A150-B4B7143CE932}" type="datetimeFigureOut">
               <a:rPr lang="en-NL" smtClean="0"/>
-              <a:t>07/11/2023</a:t>
+              <a:t>19/11/2023</a:t>
             </a:fld>
             <a:endParaRPr lang="en-NL"/>
           </a:p>
@@ -3372,7 +3373,7 @@
           <a:p>
             <a:fld id="{738102A4-E71B-0447-A150-B4B7143CE932}" type="datetimeFigureOut">
               <a:rPr lang="en-NL" smtClean="0"/>
-              <a:t>07/11/2023</a:t>
+              <a:t>19/11/2023</a:t>
             </a:fld>
             <a:endParaRPr lang="en-NL"/>
           </a:p>
@@ -8591,7 +8592,7 @@
           <p:cNvPr id="2" name="Title 1">
             <a:extLst>
               <a:ext uri="{FF2B5EF4-FFF2-40B4-BE49-F238E27FC236}">
-                <a16:creationId xmlns:a16="http://schemas.microsoft.com/office/drawing/2014/main" id="{034C64BF-CAA1-4BC9-B6E3-53EF9B1BB125}"/>
+                <a16:creationId xmlns:a16="http://schemas.microsoft.com/office/drawing/2014/main" id="{ABC6CC02-8B61-5C55-8DA8-C3044DC627CE}"/>
               </a:ext>
             </a:extLst>
           </p:cNvPr>
@@ -8609,7 +8610,7 @@
           <a:p>
             <a:r>
               <a:rPr lang="en-NL" dirty="0"/>
-              <a:t>How to get the correct time?</a:t>
+              <a:t>States &amp; Errors</a:t>
             </a:r>
           </a:p>
         </p:txBody>
@@ -8619,7 +8620,7 @@
           <p:cNvPr id="3" name="Content Placeholder 2">
             <a:extLst>
               <a:ext uri="{FF2B5EF4-FFF2-40B4-BE49-F238E27FC236}">
-                <a16:creationId xmlns:a16="http://schemas.microsoft.com/office/drawing/2014/main" id="{C45248CA-CAC1-DC1F-BD7F-A9916F443C03}"/>
+                <a16:creationId xmlns:a16="http://schemas.microsoft.com/office/drawing/2014/main" id="{F9F02F12-5CE6-C518-8E95-71B720B7ADE3}"/>
               </a:ext>
             </a:extLst>
           </p:cNvPr>
@@ -8632,150 +8633,173 @@
         </p:nvSpPr>
         <p:spPr>
           <a:xfrm>
-            <a:off x="838200" y="1408014"/>
-            <a:ext cx="10515600" cy="4768949"/>
+            <a:off x="830108" y="1825625"/>
+            <a:ext cx="10515600" cy="4351338"/>
           </a:xfrm>
         </p:spPr>
         <p:txBody>
           <a:bodyPr>
-            <a:normAutofit fontScale="92500" lnSpcReduction="10000"/>
+            <a:normAutofit/>
           </a:bodyPr>
           <a:lstStyle/>
           <a:p>
             <a:r>
               <a:rPr lang="en-NL" dirty="0"/>
-              <a:t>RTC library: </a:t>
-            </a:r>
-            <a:r>
-              <a:rPr lang="en-GB" dirty="0">
-                <a:hlinkClick r:id="rId2"/>
-              </a:rPr>
-              <a:t>https://github.com/PaulStoffregen/DS1307RTC</a:t>
-            </a:r>
-            <a:endParaRPr lang="en-GB" dirty="0"/>
-          </a:p>
-          <a:p>
-            <a:r>
-              <a:rPr lang="en-GB" dirty="0"/>
-              <a:t>Time library: </a:t>
-            </a:r>
-            <a:r>
-              <a:rPr lang="en-GB" dirty="0">
-                <a:hlinkClick r:id="rId3"/>
-              </a:rPr>
-              <a:t>https://github.com/PaulStoffregen/Time</a:t>
-            </a:r>
-            <a:endParaRPr lang="en-GB" dirty="0"/>
-          </a:p>
-          <a:p>
-            <a:r>
-              <a:rPr lang="en-GB" dirty="0" err="1"/>
-              <a:t>TimeZone</a:t>
-            </a:r>
-            <a:r>
-              <a:rPr lang="en-GB" dirty="0"/>
-              <a:t> library: </a:t>
-            </a:r>
-            <a:r>
-              <a:rPr lang="en-GB" dirty="0">
-                <a:hlinkClick r:id="rId4"/>
-              </a:rPr>
-              <a:t>https://github.com/JChristensen/Timezone</a:t>
-            </a:r>
-            <a:r>
-              <a:rPr lang="en-GB" dirty="0"/>
-              <a:t> </a:t>
-            </a:r>
-          </a:p>
-          <a:p>
+              <a:t>States (regenboog kleuren)</a:t>
+            </a:r>
+          </a:p>
+          <a:p>
+            <a:pPr lvl="1"/>
+            <a:r>
+              <a:rPr lang="en-NL" b="1" dirty="0">
+                <a:solidFill>
+                  <a:schemeClr val="accent6"/>
+                </a:solidFill>
+              </a:rPr>
+              <a:t>Initial</a:t>
+            </a:r>
             <a:r>
               <a:rPr lang="en-NL" dirty="0"/>
-              <a:t>Arduino interne tijd is niet accuraat </a:t>
-            </a:r>
+              <a:t>						</a:t>
+            </a:r>
+            <a:r>
+              <a:rPr lang="en-NL" b="1" dirty="0"/>
+              <a:t>LED uit</a:t>
+            </a:r>
+          </a:p>
+          <a:p>
+            <a:pPr lvl="1"/>
+            <a:r>
+              <a:rPr lang="en-NL" dirty="0"/>
+              <a:t>???						paars</a:t>
+            </a:r>
+          </a:p>
+          <a:p>
+            <a:pPr lvl="1"/>
+            <a:r>
+              <a:rPr lang="en-NL"/>
+              <a:t>Kleurentester</a:t>
+            </a:r>
+            <a:r>
+              <a:rPr lang="en-NL" dirty="0"/>
+              <a:t>					blauw</a:t>
+            </a:r>
+          </a:p>
+          <a:p>
+            <a:pPr lvl="1"/>
+            <a:r>
+              <a:rPr lang="en-GB" b="1" dirty="0">
+                <a:solidFill>
+                  <a:schemeClr val="accent6"/>
+                </a:solidFill>
+              </a:rPr>
+              <a:t>O</a:t>
+            </a:r>
+            <a:r>
+              <a:rPr lang="en-NL" b="1" dirty="0">
+                <a:solidFill>
+                  <a:schemeClr val="accent6"/>
+                </a:solidFill>
+              </a:rPr>
+              <a:t>n-line </a:t>
+            </a:r>
+            <a:r>
+              <a:rPr lang="en-NL" dirty="0"/>
+              <a:t>– in sync   	== STA-mode		</a:t>
+            </a:r>
+            <a:r>
+              <a:rPr lang="en-NL" b="1" dirty="0"/>
+              <a:t>groen</a:t>
+            </a:r>
+            <a:r>
+              <a:rPr lang="en-NL" dirty="0"/>
+              <a:t>		</a:t>
+            </a:r>
+          </a:p>
+          <a:p>
+            <a:pPr lvl="1"/>
+            <a:r>
+              <a:rPr lang="en-NL" dirty="0"/>
+              <a:t>On-line – no sync	== STA-mode		geel</a:t>
+            </a:r>
+          </a:p>
+          <a:p>
+            <a:pPr lvl="1"/>
+            <a:r>
+              <a:rPr lang="en-NL" b="1" dirty="0">
+                <a:solidFill>
+                  <a:schemeClr val="accent6"/>
+                </a:solidFill>
+              </a:rPr>
+              <a:t>Off-line</a:t>
+            </a:r>
+            <a:r>
+              <a:rPr lang="en-NL" dirty="0"/>
+              <a:t> – no WiFi	== AP-Mode		</a:t>
+            </a:r>
+            <a:r>
+              <a:rPr lang="en-NL" b="1" dirty="0"/>
+              <a:t>oranje</a:t>
+            </a:r>
+            <a:r>
+              <a:rPr lang="en-NL" dirty="0"/>
+              <a:t>	</a:t>
+            </a:r>
+          </a:p>
+          <a:p>
+            <a:r>
+              <a:rPr lang="en-NL" dirty="0"/>
+              <a:t>Errors – pulserend bij opstarten		</a:t>
+            </a:r>
+          </a:p>
+          <a:p>
+            <a:pPr lvl="1"/>
             <a:r>
               <a:rPr lang="en-NL" dirty="0">
-                <a:sym typeface="Wingdings" pitchFamily="2" charset="2"/>
-              </a:rPr>
-              <a:t> gebruik RTC </a:t>
+                <a:solidFill>
+                  <a:schemeClr val="accent6"/>
+                </a:solidFill>
+              </a:rPr>
+              <a:t>HW – error</a:t>
             </a:r>
             <a:r>
               <a:rPr lang="en-NL" dirty="0"/>
-              <a:t>en sync Arduino iedere 5 minuten met de RTC , dit doet de Time library</a:t>
-            </a:r>
-          </a:p>
-          <a:p>
+              <a:t>		15 x blink rood [RTC not found]</a:t>
+            </a:r>
+          </a:p>
+          <a:p>
+            <a:pPr lvl="1"/>
+            <a:r>
+              <a:rPr lang="en-NL" dirty="0">
+                <a:solidFill>
+                  <a:schemeClr val="accent6"/>
+                </a:solidFill>
+              </a:rPr>
+              <a:t>OTA – error</a:t>
+            </a:r>
             <a:r>
               <a:rPr lang="en-NL" dirty="0"/>
-              <a:t>Zet alle tijd sources in UTC tijd (RTC en NTP)</a:t>
-            </a:r>
-          </a:p>
-          <a:p>
-            <a:r>
-              <a:rPr lang="en-NL" dirty="0"/>
-              <a:t>Sync RTC met NTP als NTP tijd beschikbaar komt</a:t>
-            </a:r>
-          </a:p>
-          <a:p>
-            <a:r>
-              <a:rPr lang="en-NL" dirty="0"/>
-              <a:t>Gebruik de TZ library voor zomertijd aanpassing</a:t>
-            </a:r>
-          </a:p>
-          <a:p>
-            <a:r>
-              <a:rPr lang="en-NL" b="1" dirty="0"/>
-              <a:t>WiFi not connected </a:t>
-            </a:r>
-            <a:r>
-              <a:rPr lang="en-NL" dirty="0">
-                <a:sym typeface="Wingdings" pitchFamily="2" charset="2"/>
-              </a:rPr>
-              <a:t> g</a:t>
-            </a:r>
-            <a:r>
-              <a:rPr lang="en-NL" dirty="0"/>
-              <a:t>ebruik de UTC tijd van de RTC</a:t>
-            </a:r>
-          </a:p>
-          <a:p>
-            <a:r>
-              <a:rPr lang="en-NL" b="1" dirty="0"/>
-              <a:t>WiFi connected </a:t>
-            </a:r>
-            <a:r>
-              <a:rPr lang="en-NL" dirty="0">
-                <a:sym typeface="Wingdings" pitchFamily="2" charset="2"/>
-              </a:rPr>
-              <a:t> start NTP en vraag om de </a:t>
-            </a:r>
-            <a:r>
-              <a:rPr lang="en-NL" i="1" u="sng" dirty="0">
-                <a:sym typeface="Wingdings" pitchFamily="2" charset="2"/>
-              </a:rPr>
-              <a:t>UTC Tijd</a:t>
+              <a:t>		15 x blink oranje	</a:t>
             </a:r>
           </a:p>
           <a:p>
             <a:pPr lvl="1"/>
-            <a:r>
-              <a:rPr lang="en-GB" dirty="0">
-                <a:sym typeface="Wingdings" pitchFamily="2" charset="2"/>
-              </a:rPr>
-              <a:t>If NTP time is available: 	I</a:t>
-            </a:r>
-            <a:r>
-              <a:rPr lang="en-NL" dirty="0">
-                <a:sym typeface="Wingdings" pitchFamily="2" charset="2"/>
-              </a:rPr>
-              <a:t>f RTC != NTP  update RTC</a:t>
-            </a:r>
+            <a:endParaRPr lang="en-NL" dirty="0"/>
+          </a:p>
+          <a:p>
+            <a:pPr lvl="1"/>
+            <a:endParaRPr lang="en-NL" dirty="0"/>
+          </a:p>
+          <a:p>
+            <a:pPr lvl="1"/>
+            <a:endParaRPr lang="en-NL" dirty="0"/>
           </a:p>
         </p:txBody>
       </p:sp>
     </p:spTree>
     <p:extLst>
       <p:ext uri="{BB962C8B-B14F-4D97-AF65-F5344CB8AC3E}">
-        <p14:creationId xmlns:p14="http://schemas.microsoft.com/office/powerpoint/2010/main" val="3277620660"/>
+        <p14:creationId xmlns:p14="http://schemas.microsoft.com/office/powerpoint/2010/main" val="3725175912"/>
       </p:ext>
     </p:extLst>
   </p:cSld>
@@ -8807,7 +8831,7 @@
           <p:cNvPr id="2" name="Title 1">
             <a:extLst>
               <a:ext uri="{FF2B5EF4-FFF2-40B4-BE49-F238E27FC236}">
-                <a16:creationId xmlns:a16="http://schemas.microsoft.com/office/drawing/2014/main" id="{84576E15-5C11-6104-D505-BC430D56E2C9}"/>
+                <a16:creationId xmlns:a16="http://schemas.microsoft.com/office/drawing/2014/main" id="{034C64BF-CAA1-4BC9-B6E3-53EF9B1BB125}"/>
               </a:ext>
             </a:extLst>
           </p:cNvPr>
@@ -8825,7 +8849,7 @@
           <a:p>
             <a:r>
               <a:rPr lang="en-NL" dirty="0"/>
-              <a:t>Time (2)</a:t>
+              <a:t>How to get the correct time?</a:t>
             </a:r>
           </a:p>
         </p:txBody>
@@ -8835,7 +8859,7 @@
           <p:cNvPr id="3" name="Content Placeholder 2">
             <a:extLst>
               <a:ext uri="{FF2B5EF4-FFF2-40B4-BE49-F238E27FC236}">
-                <a16:creationId xmlns:a16="http://schemas.microsoft.com/office/drawing/2014/main" id="{D17133DA-C0CA-6A94-FAC4-76F341843E5F}"/>
+                <a16:creationId xmlns:a16="http://schemas.microsoft.com/office/drawing/2014/main" id="{C45248CA-CAC1-DC1F-BD7F-A9916F443C03}"/>
               </a:ext>
             </a:extLst>
           </p:cNvPr>
@@ -8846,187 +8870,144 @@
             <p:ph idx="1"/>
           </p:nvPr>
         </p:nvSpPr>
-        <p:spPr/>
+        <p:spPr>
+          <a:xfrm>
+            <a:off x="838200" y="1408014"/>
+            <a:ext cx="10515600" cy="4768949"/>
+          </a:xfrm>
+        </p:spPr>
         <p:txBody>
           <a:bodyPr>
-            <a:normAutofit/>
+            <a:normAutofit fontScale="92500" lnSpcReduction="10000"/>
           </a:bodyPr>
           <a:lstStyle/>
           <a:p>
             <a:r>
               <a:rPr lang="en-NL" dirty="0"/>
-              <a:t>Always focus on </a:t>
-            </a:r>
-            <a:r>
-              <a:rPr lang="en-GB" b="0" i="0" u="none" strike="noStrike" dirty="0">
-                <a:solidFill>
-                  <a:srgbClr val="454545"/>
-                </a:solidFill>
-                <a:effectLst/>
-                <a:latin typeface="Helvetica" pitchFamily="2" charset="0"/>
-              </a:rPr>
-              <a:t>Coordinated Universal Time (UTC)</a:t>
-            </a:r>
-            <a:endParaRPr lang="en-GB" dirty="0">
-              <a:solidFill>
-                <a:srgbClr val="454545"/>
-              </a:solidFill>
-              <a:latin typeface="Helvetica" pitchFamily="2" charset="0"/>
-            </a:endParaRPr>
+              <a:t>RTC library: </a:t>
+            </a:r>
+            <a:r>
+              <a:rPr lang="en-GB" dirty="0">
+                <a:hlinkClick r:id="rId2"/>
+              </a:rPr>
+              <a:t>https://github.com/PaulStoffregen/DS1307RTC</a:t>
+            </a:r>
+            <a:endParaRPr lang="en-GB" dirty="0"/>
+          </a:p>
+          <a:p>
+            <a:r>
+              <a:rPr lang="en-GB" dirty="0"/>
+              <a:t>Time library: </a:t>
+            </a:r>
+            <a:r>
+              <a:rPr lang="en-GB" dirty="0">
+                <a:hlinkClick r:id="rId3"/>
+              </a:rPr>
+              <a:t>https://github.com/PaulStoffregen/Time</a:t>
+            </a:r>
+            <a:endParaRPr lang="en-GB" dirty="0"/>
+          </a:p>
+          <a:p>
+            <a:r>
+              <a:rPr lang="en-GB" dirty="0" err="1"/>
+              <a:t>TimeZone</a:t>
+            </a:r>
+            <a:r>
+              <a:rPr lang="en-GB" dirty="0"/>
+              <a:t> library: </a:t>
+            </a:r>
+            <a:r>
+              <a:rPr lang="en-GB" dirty="0">
+                <a:hlinkClick r:id="rId4"/>
+              </a:rPr>
+              <a:t>https://github.com/JChristensen/Timezone</a:t>
+            </a:r>
+            <a:r>
+              <a:rPr lang="en-GB" dirty="0"/>
+              <a:t> </a:t>
+            </a:r>
+          </a:p>
+          <a:p>
+            <a:r>
+              <a:rPr lang="en-NL" dirty="0"/>
+              <a:t>Arduino interne tijd is niet accuraat </a:t>
+            </a:r>
+            <a:r>
+              <a:rPr lang="en-NL" dirty="0">
+                <a:sym typeface="Wingdings" pitchFamily="2" charset="2"/>
+              </a:rPr>
+              <a:t> gebruik RTC </a:t>
+            </a:r>
+            <a:r>
+              <a:rPr lang="en-NL" dirty="0"/>
+              <a:t>en sync Arduino iedere 5 minuten met de RTC , dit doet de Time library</a:t>
+            </a:r>
+          </a:p>
+          <a:p>
+            <a:r>
+              <a:rPr lang="en-NL" dirty="0"/>
+              <a:t>Zet alle tijd sources in UTC tijd (RTC en NTP)</a:t>
+            </a:r>
+          </a:p>
+          <a:p>
+            <a:r>
+              <a:rPr lang="en-NL" dirty="0"/>
+              <a:t>Sync RTC met NTP als NTP tijd beschikbaar komt</a:t>
+            </a:r>
+          </a:p>
+          <a:p>
+            <a:r>
+              <a:rPr lang="en-NL" dirty="0"/>
+              <a:t>Gebruik de TZ library voor zomertijd aanpassing</a:t>
+            </a:r>
+          </a:p>
+          <a:p>
+            <a:r>
+              <a:rPr lang="en-NL" b="1" dirty="0"/>
+              <a:t>WiFi not connected </a:t>
+            </a:r>
+            <a:r>
+              <a:rPr lang="en-NL" dirty="0">
+                <a:sym typeface="Wingdings" pitchFamily="2" charset="2"/>
+              </a:rPr>
+              <a:t> g</a:t>
+            </a:r>
+            <a:r>
+              <a:rPr lang="en-NL" dirty="0"/>
+              <a:t>ebruik de UTC tijd van de RTC</a:t>
+            </a:r>
+          </a:p>
+          <a:p>
+            <a:r>
+              <a:rPr lang="en-NL" b="1" dirty="0"/>
+              <a:t>WiFi connected </a:t>
+            </a:r>
+            <a:r>
+              <a:rPr lang="en-NL" dirty="0">
+                <a:sym typeface="Wingdings" pitchFamily="2" charset="2"/>
+              </a:rPr>
+              <a:t> start NTP en vraag om de </a:t>
+            </a:r>
+            <a:r>
+              <a:rPr lang="en-NL" i="1" u="sng" dirty="0">
+                <a:sym typeface="Wingdings" pitchFamily="2" charset="2"/>
+              </a:rPr>
+              <a:t>UTC Tijd</a:t>
+            </a:r>
           </a:p>
           <a:p>
             <a:pPr lvl="1"/>
             <a:r>
               <a:rPr lang="en-GB" dirty="0">
-                <a:solidFill>
-                  <a:srgbClr val="454545"/>
-                </a:solidFill>
-                <a:latin typeface="Helvetica" pitchFamily="2" charset="0"/>
-              </a:rPr>
-              <a:t>Make NTP and RTC keep UTC time. </a:t>
-            </a:r>
-          </a:p>
-          <a:p>
-            <a:pPr lvl="1"/>
-            <a:r>
-              <a:rPr lang="en-GB" b="0" i="0" u="none" strike="noStrike" dirty="0">
-                <a:solidFill>
-                  <a:srgbClr val="454545"/>
-                </a:solidFill>
-                <a:effectLst/>
-                <a:latin typeface="Helvetica" pitchFamily="2" charset="0"/>
-              </a:rPr>
-              <a:t>UTC is not a </a:t>
-            </a:r>
-            <a:r>
-              <a:rPr lang="en-GB" b="0" i="0" u="none" strike="noStrike" dirty="0" err="1">
-                <a:solidFill>
-                  <a:srgbClr val="454545"/>
-                </a:solidFill>
-                <a:effectLst/>
-                <a:latin typeface="Helvetica" pitchFamily="2" charset="0"/>
-              </a:rPr>
-              <a:t>Timezone</a:t>
-            </a:r>
-            <a:r>
-              <a:rPr lang="en-GB" b="0" i="0" u="none" strike="noStrike" dirty="0">
-                <a:solidFill>
-                  <a:srgbClr val="454545"/>
-                </a:solidFill>
-                <a:effectLst/>
-                <a:latin typeface="Helvetica" pitchFamily="2" charset="0"/>
-              </a:rPr>
-              <a:t> but a time standard</a:t>
-            </a:r>
-          </a:p>
-          <a:p>
-            <a:r>
-              <a:rPr lang="en-GB" dirty="0">
-                <a:solidFill>
-                  <a:srgbClr val="454545"/>
-                </a:solidFill>
-                <a:latin typeface="Helvetica" pitchFamily="2" charset="0"/>
-              </a:rPr>
-              <a:t>Always use the RTC as time source</a:t>
-            </a:r>
-          </a:p>
-          <a:p>
-            <a:r>
-              <a:rPr lang="en-GB" dirty="0">
-                <a:solidFill>
-                  <a:srgbClr val="454545"/>
-                </a:solidFill>
-                <a:latin typeface="Helvetica" pitchFamily="2" charset="0"/>
-              </a:rPr>
-              <a:t>Keep RTC in sync with NTP</a:t>
-            </a:r>
-          </a:p>
-          <a:p>
-            <a:r>
-              <a:rPr lang="en-GB" dirty="0">
-                <a:solidFill>
-                  <a:srgbClr val="454545"/>
-                </a:solidFill>
-                <a:latin typeface="Helvetica" pitchFamily="2" charset="0"/>
-              </a:rPr>
-              <a:t>NTP happens to update the </a:t>
-            </a:r>
-            <a:r>
-              <a:rPr lang="en-GB" dirty="0" err="1">
-                <a:solidFill>
-                  <a:srgbClr val="454545"/>
-                </a:solidFill>
-                <a:latin typeface="Helvetica" pitchFamily="2" charset="0"/>
-              </a:rPr>
-              <a:t>systemtime</a:t>
-            </a:r>
-            <a:endParaRPr lang="en-GB" dirty="0">
-              <a:solidFill>
-                <a:srgbClr val="454545"/>
-              </a:solidFill>
-              <a:latin typeface="Helvetica" pitchFamily="2" charset="0"/>
-            </a:endParaRPr>
-          </a:p>
-          <a:p>
-            <a:r>
-              <a:rPr lang="en-GB" dirty="0">
-                <a:solidFill>
-                  <a:srgbClr val="454545"/>
-                </a:solidFill>
-                <a:latin typeface="Helvetica" pitchFamily="2" charset="0"/>
-              </a:rPr>
-              <a:t>Use standard C functions: </a:t>
-            </a:r>
-          </a:p>
-          <a:p>
-            <a:pPr lvl="1"/>
-            <a:r>
-              <a:rPr lang="en-GB" dirty="0">
-                <a:solidFill>
-                  <a:srgbClr val="454545"/>
-                </a:solidFill>
-                <a:latin typeface="Helvetica" pitchFamily="2" charset="0"/>
-              </a:rPr>
-              <a:t>time() 		get system time</a:t>
-            </a:r>
-          </a:p>
-          <a:p>
-            <a:pPr lvl="1"/>
-            <a:r>
-              <a:rPr lang="en-GB" dirty="0" err="1">
-                <a:solidFill>
-                  <a:srgbClr val="454545"/>
-                </a:solidFill>
-                <a:latin typeface="Helvetica" pitchFamily="2" charset="0"/>
-              </a:rPr>
-              <a:t>ctime</a:t>
-            </a:r>
-            <a:r>
-              <a:rPr lang="en-GB" dirty="0">
-                <a:solidFill>
-                  <a:srgbClr val="454545"/>
-                </a:solidFill>
-                <a:latin typeface="Helvetica" pitchFamily="2" charset="0"/>
-              </a:rPr>
-              <a:t>()		convert </a:t>
-            </a:r>
-            <a:r>
-              <a:rPr lang="en-GB" dirty="0" err="1">
-                <a:solidFill>
-                  <a:srgbClr val="454545"/>
-                </a:solidFill>
-                <a:latin typeface="Helvetica" pitchFamily="2" charset="0"/>
-              </a:rPr>
-              <a:t>time_t</a:t>
-            </a:r>
-            <a:r>
-              <a:rPr lang="en-GB" dirty="0">
-                <a:solidFill>
-                  <a:srgbClr val="454545"/>
-                </a:solidFill>
-                <a:latin typeface="Helvetica" pitchFamily="2" charset="0"/>
-              </a:rPr>
-              <a:t> (seconds-since-1970) to date string</a:t>
+                <a:sym typeface="Wingdings" pitchFamily="2" charset="2"/>
+              </a:rPr>
+              <a:t>If NTP time is available: 	I</a:t>
+            </a:r>
+            <a:r>
+              <a:rPr lang="en-NL" dirty="0">
+                <a:sym typeface="Wingdings" pitchFamily="2" charset="2"/>
+              </a:rPr>
+              <a:t>f RTC != NTP  update RTC</a:t>
             </a:r>
           </a:p>
         </p:txBody>
@@ -9034,7 +9015,7 @@
     </p:spTree>
     <p:extLst>
       <p:ext uri="{BB962C8B-B14F-4D97-AF65-F5344CB8AC3E}">
-        <p14:creationId xmlns:p14="http://schemas.microsoft.com/office/powerpoint/2010/main" val="3330430801"/>
+        <p14:creationId xmlns:p14="http://schemas.microsoft.com/office/powerpoint/2010/main" val="3277620660"/>
       </p:ext>
     </p:extLst>
   </p:cSld>
@@ -9063,6 +9044,265 @@
       </p:grpSpPr>
       <p:sp>
         <p:nvSpPr>
+          <p:cNvPr id="2" name="Title 1">
+            <a:extLst>
+              <a:ext uri="{FF2B5EF4-FFF2-40B4-BE49-F238E27FC236}">
+                <a16:creationId xmlns:a16="http://schemas.microsoft.com/office/drawing/2014/main" id="{84576E15-5C11-6104-D505-BC430D56E2C9}"/>
+              </a:ext>
+            </a:extLst>
+          </p:cNvPr>
+          <p:cNvSpPr>
+            <a:spLocks noGrp="1"/>
+          </p:cNvSpPr>
+          <p:nvPr>
+            <p:ph type="title"/>
+          </p:nvPr>
+        </p:nvSpPr>
+        <p:spPr/>
+        <p:txBody>
+          <a:bodyPr/>
+          <a:lstStyle/>
+          <a:p>
+            <a:r>
+              <a:rPr lang="en-NL" dirty="0"/>
+              <a:t>Time (2)</a:t>
+            </a:r>
+          </a:p>
+        </p:txBody>
+      </p:sp>
+      <p:sp>
+        <p:nvSpPr>
+          <p:cNvPr id="3" name="Content Placeholder 2">
+            <a:extLst>
+              <a:ext uri="{FF2B5EF4-FFF2-40B4-BE49-F238E27FC236}">
+                <a16:creationId xmlns:a16="http://schemas.microsoft.com/office/drawing/2014/main" id="{D17133DA-C0CA-6A94-FAC4-76F341843E5F}"/>
+              </a:ext>
+            </a:extLst>
+          </p:cNvPr>
+          <p:cNvSpPr>
+            <a:spLocks noGrp="1"/>
+          </p:cNvSpPr>
+          <p:nvPr>
+            <p:ph idx="1"/>
+          </p:nvPr>
+        </p:nvSpPr>
+        <p:spPr/>
+        <p:txBody>
+          <a:bodyPr>
+            <a:normAutofit/>
+          </a:bodyPr>
+          <a:lstStyle/>
+          <a:p>
+            <a:r>
+              <a:rPr lang="en-NL" dirty="0"/>
+              <a:t>Always focus on </a:t>
+            </a:r>
+            <a:r>
+              <a:rPr lang="en-GB" b="0" i="0" u="none" strike="noStrike" dirty="0">
+                <a:solidFill>
+                  <a:srgbClr val="454545"/>
+                </a:solidFill>
+                <a:effectLst/>
+                <a:latin typeface="Helvetica" pitchFamily="2" charset="0"/>
+              </a:rPr>
+              <a:t>Coordinated Universal Time (UTC)</a:t>
+            </a:r>
+            <a:endParaRPr lang="en-GB" dirty="0">
+              <a:solidFill>
+                <a:srgbClr val="454545"/>
+              </a:solidFill>
+              <a:latin typeface="Helvetica" pitchFamily="2" charset="0"/>
+            </a:endParaRPr>
+          </a:p>
+          <a:p>
+            <a:pPr lvl="1"/>
+            <a:r>
+              <a:rPr lang="en-GB" dirty="0">
+                <a:solidFill>
+                  <a:srgbClr val="454545"/>
+                </a:solidFill>
+                <a:latin typeface="Helvetica" pitchFamily="2" charset="0"/>
+              </a:rPr>
+              <a:t>Make NTP and RTC keep UTC time. </a:t>
+            </a:r>
+          </a:p>
+          <a:p>
+            <a:pPr lvl="1"/>
+            <a:r>
+              <a:rPr lang="en-GB" b="0" i="0" u="none" strike="noStrike" dirty="0">
+                <a:solidFill>
+                  <a:srgbClr val="454545"/>
+                </a:solidFill>
+                <a:effectLst/>
+                <a:latin typeface="Helvetica" pitchFamily="2" charset="0"/>
+              </a:rPr>
+              <a:t>UTC is not a </a:t>
+            </a:r>
+            <a:r>
+              <a:rPr lang="en-GB" b="0" i="0" u="none" strike="noStrike" dirty="0" err="1">
+                <a:solidFill>
+                  <a:srgbClr val="454545"/>
+                </a:solidFill>
+                <a:effectLst/>
+                <a:latin typeface="Helvetica" pitchFamily="2" charset="0"/>
+              </a:rPr>
+              <a:t>Timezone</a:t>
+            </a:r>
+            <a:r>
+              <a:rPr lang="en-GB" b="0" i="0" u="none" strike="noStrike" dirty="0">
+                <a:solidFill>
+                  <a:srgbClr val="454545"/>
+                </a:solidFill>
+                <a:effectLst/>
+                <a:latin typeface="Helvetica" pitchFamily="2" charset="0"/>
+              </a:rPr>
+              <a:t> but a time standard</a:t>
+            </a:r>
+          </a:p>
+          <a:p>
+            <a:r>
+              <a:rPr lang="en-GB" dirty="0">
+                <a:solidFill>
+                  <a:srgbClr val="454545"/>
+                </a:solidFill>
+                <a:latin typeface="Helvetica" pitchFamily="2" charset="0"/>
+              </a:rPr>
+              <a:t>Always use the RTC as time source</a:t>
+            </a:r>
+          </a:p>
+          <a:p>
+            <a:r>
+              <a:rPr lang="en-GB" dirty="0">
+                <a:solidFill>
+                  <a:srgbClr val="454545"/>
+                </a:solidFill>
+                <a:latin typeface="Helvetica" pitchFamily="2" charset="0"/>
+              </a:rPr>
+              <a:t>Keep RTC in sync with NTP</a:t>
+            </a:r>
+          </a:p>
+          <a:p>
+            <a:r>
+              <a:rPr lang="en-GB" dirty="0">
+                <a:solidFill>
+                  <a:srgbClr val="454545"/>
+                </a:solidFill>
+                <a:latin typeface="Helvetica" pitchFamily="2" charset="0"/>
+              </a:rPr>
+              <a:t>NTP happens to update the </a:t>
+            </a:r>
+            <a:r>
+              <a:rPr lang="en-GB" dirty="0" err="1">
+                <a:solidFill>
+                  <a:srgbClr val="454545"/>
+                </a:solidFill>
+                <a:latin typeface="Helvetica" pitchFamily="2" charset="0"/>
+              </a:rPr>
+              <a:t>systemtime</a:t>
+            </a:r>
+            <a:endParaRPr lang="en-GB" dirty="0">
+              <a:solidFill>
+                <a:srgbClr val="454545"/>
+              </a:solidFill>
+              <a:latin typeface="Helvetica" pitchFamily="2" charset="0"/>
+            </a:endParaRPr>
+          </a:p>
+          <a:p>
+            <a:r>
+              <a:rPr lang="en-GB" dirty="0">
+                <a:solidFill>
+                  <a:srgbClr val="454545"/>
+                </a:solidFill>
+                <a:latin typeface="Helvetica" pitchFamily="2" charset="0"/>
+              </a:rPr>
+              <a:t>Use standard C functions: </a:t>
+            </a:r>
+          </a:p>
+          <a:p>
+            <a:pPr lvl="1"/>
+            <a:r>
+              <a:rPr lang="en-GB" dirty="0">
+                <a:solidFill>
+                  <a:srgbClr val="454545"/>
+                </a:solidFill>
+                <a:latin typeface="Helvetica" pitchFamily="2" charset="0"/>
+              </a:rPr>
+              <a:t>time() 		get system time</a:t>
+            </a:r>
+          </a:p>
+          <a:p>
+            <a:pPr lvl="1"/>
+            <a:r>
+              <a:rPr lang="en-GB" dirty="0" err="1">
+                <a:solidFill>
+                  <a:srgbClr val="454545"/>
+                </a:solidFill>
+                <a:latin typeface="Helvetica" pitchFamily="2" charset="0"/>
+              </a:rPr>
+              <a:t>ctime</a:t>
+            </a:r>
+            <a:r>
+              <a:rPr lang="en-GB" dirty="0">
+                <a:solidFill>
+                  <a:srgbClr val="454545"/>
+                </a:solidFill>
+                <a:latin typeface="Helvetica" pitchFamily="2" charset="0"/>
+              </a:rPr>
+              <a:t>()		convert </a:t>
+            </a:r>
+            <a:r>
+              <a:rPr lang="en-GB" dirty="0" err="1">
+                <a:solidFill>
+                  <a:srgbClr val="454545"/>
+                </a:solidFill>
+                <a:latin typeface="Helvetica" pitchFamily="2" charset="0"/>
+              </a:rPr>
+              <a:t>time_t</a:t>
+            </a:r>
+            <a:r>
+              <a:rPr lang="en-GB" dirty="0">
+                <a:solidFill>
+                  <a:srgbClr val="454545"/>
+                </a:solidFill>
+                <a:latin typeface="Helvetica" pitchFamily="2" charset="0"/>
+              </a:rPr>
+              <a:t> (seconds-since-1970) to date string</a:t>
+            </a:r>
+          </a:p>
+        </p:txBody>
+      </p:sp>
+    </p:spTree>
+    <p:extLst>
+      <p:ext uri="{BB962C8B-B14F-4D97-AF65-F5344CB8AC3E}">
+        <p14:creationId xmlns:p14="http://schemas.microsoft.com/office/powerpoint/2010/main" val="3330430801"/>
+      </p:ext>
+    </p:extLst>
+  </p:cSld>
+  <p:clrMapOvr>
+    <a:masterClrMapping/>
+  </p:clrMapOvr>
+</p:sld>
+</file>
+
+<file path=ppt/slides/slide6.xml><?xml version="1.0" encoding="utf-8"?>
+<p:sld xmlns:a="http://schemas.openxmlformats.org/drawingml/2006/main" xmlns:r="http://schemas.openxmlformats.org/officeDocument/2006/relationships" xmlns:p="http://schemas.openxmlformats.org/presentationml/2006/main">
+  <p:cSld>
+    <p:spTree>
+      <p:nvGrpSpPr>
+        <p:cNvPr id="1" name=""/>
+        <p:cNvGrpSpPr/>
+        <p:nvPr/>
+      </p:nvGrpSpPr>
+      <p:grpSpPr>
+        <a:xfrm>
+          <a:off x="0" y="0"/>
+          <a:ext cx="0" cy="0"/>
+          <a:chOff x="0" y="0"/>
+          <a:chExt cx="0" cy="0"/>
+        </a:xfrm>
+      </p:grpSpPr>
+      <p:sp>
+        <p:nvSpPr>
           <p:cNvPr id="3" name="Content Placeholder 2">
             <a:extLst>
               <a:ext uri="{FF2B5EF4-FFF2-40B4-BE49-F238E27FC236}">
@@ -10513,7 +10753,7 @@
 </p:sld>
 </file>
 
-<file path=ppt/slides/slide6.xml><?xml version="1.0" encoding="utf-8"?>
+<file path=ppt/slides/slide7.xml><?xml version="1.0" encoding="utf-8"?>
 <p:sld xmlns:a="http://schemas.openxmlformats.org/drawingml/2006/main" xmlns:r="http://schemas.openxmlformats.org/officeDocument/2006/relationships" xmlns:p="http://schemas.openxmlformats.org/presentationml/2006/main">
   <p:cSld>
     <p:spTree>

</xml_diff>